<commit_message>
preprocessed train, added prediction, evaluation
</commit_message>
<xml_diff>
--- a/report.pptx
+++ b/report.pptx
@@ -15,11 +15,13 @@
     <p:sldId id="263" r:id="rId9"/>
     <p:sldId id="265" r:id="rId10"/>
     <p:sldId id="266" r:id="rId11"/>
-    <p:sldId id="273" r:id="rId12"/>
-    <p:sldId id="269" r:id="rId13"/>
-    <p:sldId id="272" r:id="rId14"/>
-    <p:sldId id="271" r:id="rId15"/>
-    <p:sldId id="274" r:id="rId16"/>
+    <p:sldId id="275" r:id="rId12"/>
+    <p:sldId id="276" r:id="rId13"/>
+    <p:sldId id="273" r:id="rId14"/>
+    <p:sldId id="269" r:id="rId15"/>
+    <p:sldId id="272" r:id="rId16"/>
+    <p:sldId id="271" r:id="rId17"/>
+    <p:sldId id="274" r:id="rId18"/>
   </p:sldIdLst>
   <p:sldSz cx="12192000" cy="6858000"/>
   <p:notesSz cx="6858000" cy="9144000"/>
@@ -257,7 +259,7 @@
           <a:p>
             <a:fld id="{0100C354-799F-9546-AD5A-B2BED52A390A}" type="datetimeFigureOut">
               <a:rPr lang="en-US" smtClean="0"/>
-              <a:t>5/14/17</a:t>
+              <a:t>5/15/17</a:t>
             </a:fld>
             <a:endParaRPr lang="en-US"/>
           </a:p>
@@ -427,7 +429,7 @@
           <a:p>
             <a:fld id="{0100C354-799F-9546-AD5A-B2BED52A390A}" type="datetimeFigureOut">
               <a:rPr lang="en-US" smtClean="0"/>
-              <a:t>5/14/17</a:t>
+              <a:t>5/15/17</a:t>
             </a:fld>
             <a:endParaRPr lang="en-US"/>
           </a:p>
@@ -607,7 +609,7 @@
           <a:p>
             <a:fld id="{0100C354-799F-9546-AD5A-B2BED52A390A}" type="datetimeFigureOut">
               <a:rPr lang="en-US" smtClean="0"/>
-              <a:t>5/14/17</a:t>
+              <a:t>5/15/17</a:t>
             </a:fld>
             <a:endParaRPr lang="en-US"/>
           </a:p>
@@ -777,7 +779,7 @@
           <a:p>
             <a:fld id="{0100C354-799F-9546-AD5A-B2BED52A390A}" type="datetimeFigureOut">
               <a:rPr lang="en-US" smtClean="0"/>
-              <a:t>5/14/17</a:t>
+              <a:t>5/15/17</a:t>
             </a:fld>
             <a:endParaRPr lang="en-US"/>
           </a:p>
@@ -1023,7 +1025,7 @@
           <a:p>
             <a:fld id="{0100C354-799F-9546-AD5A-B2BED52A390A}" type="datetimeFigureOut">
               <a:rPr lang="en-US" smtClean="0"/>
-              <a:t>5/14/17</a:t>
+              <a:t>5/15/17</a:t>
             </a:fld>
             <a:endParaRPr lang="en-US"/>
           </a:p>
@@ -1255,7 +1257,7 @@
           <a:p>
             <a:fld id="{0100C354-799F-9546-AD5A-B2BED52A390A}" type="datetimeFigureOut">
               <a:rPr lang="en-US" smtClean="0"/>
-              <a:t>5/14/17</a:t>
+              <a:t>5/15/17</a:t>
             </a:fld>
             <a:endParaRPr lang="en-US"/>
           </a:p>
@@ -1622,7 +1624,7 @@
           <a:p>
             <a:fld id="{0100C354-799F-9546-AD5A-B2BED52A390A}" type="datetimeFigureOut">
               <a:rPr lang="en-US" smtClean="0"/>
-              <a:t>5/14/17</a:t>
+              <a:t>5/15/17</a:t>
             </a:fld>
             <a:endParaRPr lang="en-US"/>
           </a:p>
@@ -1740,7 +1742,7 @@
           <a:p>
             <a:fld id="{0100C354-799F-9546-AD5A-B2BED52A390A}" type="datetimeFigureOut">
               <a:rPr lang="en-US" smtClean="0"/>
-              <a:t>5/14/17</a:t>
+              <a:t>5/15/17</a:t>
             </a:fld>
             <a:endParaRPr lang="en-US"/>
           </a:p>
@@ -1835,7 +1837,7 @@
           <a:p>
             <a:fld id="{0100C354-799F-9546-AD5A-B2BED52A390A}" type="datetimeFigureOut">
               <a:rPr lang="en-US" smtClean="0"/>
-              <a:t>5/14/17</a:t>
+              <a:t>5/15/17</a:t>
             </a:fld>
             <a:endParaRPr lang="en-US"/>
           </a:p>
@@ -2112,7 +2114,7 @@
           <a:p>
             <a:fld id="{0100C354-799F-9546-AD5A-B2BED52A390A}" type="datetimeFigureOut">
               <a:rPr lang="en-US" smtClean="0"/>
-              <a:t>5/14/17</a:t>
+              <a:t>5/15/17</a:t>
             </a:fld>
             <a:endParaRPr lang="en-US"/>
           </a:p>
@@ -2365,7 +2367,7 @@
           <a:p>
             <a:fld id="{0100C354-799F-9546-AD5A-B2BED52A390A}" type="datetimeFigureOut">
               <a:rPr lang="en-US" smtClean="0"/>
-              <a:t>5/14/17</a:t>
+              <a:t>5/15/17</a:t>
             </a:fld>
             <a:endParaRPr lang="en-US"/>
           </a:p>
@@ -2578,7 +2580,7 @@
           <a:p>
             <a:fld id="{0100C354-799F-9546-AD5A-B2BED52A390A}" type="datetimeFigureOut">
               <a:rPr lang="en-US" smtClean="0"/>
-              <a:t>5/14/17</a:t>
+              <a:t>5/15/17</a:t>
             </a:fld>
             <a:endParaRPr lang="en-US"/>
           </a:p>
@@ -3435,7 +3437,7 @@
         <p:spPr>
           <a:xfrm>
             <a:off x="399738" y="162993"/>
-            <a:ext cx="7312277" cy="586515"/>
+            <a:ext cx="4488785" cy="586515"/>
           </a:xfrm>
         </p:spPr>
         <p:txBody>
@@ -3447,1026 +3449,166 @@
             <a:pPr algn="l"/>
             <a:r>
               <a:rPr lang="en-US" sz="4000" b="1" dirty="0" smtClean="0"/>
-              <a:t>Evaluation</a:t>
+              <a:t>Training</a:t>
             </a:r>
             <a:endParaRPr lang="en-US" sz="4000" b="1" dirty="0"/>
           </a:p>
         </p:txBody>
       </p:sp>
-      <p:sp>
-        <p:nvSpPr>
-          <p:cNvPr id="4" name="TextBox 3"/>
-          <p:cNvSpPr txBox="1"/>
-          <p:nvPr/>
-        </p:nvSpPr>
-        <p:spPr>
-          <a:xfrm>
-            <a:off x="1759788" y="1856172"/>
-            <a:ext cx="1531168" cy="369332"/>
-          </a:xfrm>
-          <a:prstGeom prst="rect">
-            <a:avLst/>
-          </a:prstGeom>
-          <a:noFill/>
-        </p:spPr>
-        <p:txBody>
-          <a:bodyPr wrap="square" rtlCol="0">
-            <a:spAutoFit/>
-          </a:bodyPr>
-          <a:lstStyle/>
-          <a:p>
-            <a:r>
-              <a:rPr lang="en-US" dirty="0" smtClean="0"/>
-              <a:t>Crop </a:t>
-            </a:r>
-            <a:r>
-              <a:rPr lang="en-US" smtClean="0"/>
-              <a:t>by suffix</a:t>
-            </a:r>
-            <a:endParaRPr lang="en-US" dirty="0"/>
-          </a:p>
-        </p:txBody>
-      </p:sp>
-      <p:sp>
-        <p:nvSpPr>
-          <p:cNvPr id="17" name="TextBox 16"/>
-          <p:cNvSpPr txBox="1"/>
-          <p:nvPr/>
-        </p:nvSpPr>
-        <p:spPr>
-          <a:xfrm>
-            <a:off x="4790538" y="1899281"/>
-            <a:ext cx="1831676" cy="369332"/>
-          </a:xfrm>
-          <a:prstGeom prst="rect">
-            <a:avLst/>
-          </a:prstGeom>
-          <a:noFill/>
-        </p:spPr>
-        <p:txBody>
-          <a:bodyPr wrap="square" rtlCol="0">
-            <a:spAutoFit/>
-          </a:bodyPr>
-          <a:lstStyle/>
-          <a:p>
-            <a:r>
-              <a:rPr lang="en-US" smtClean="0"/>
-              <a:t>One-hot encode</a:t>
-            </a:r>
-            <a:endParaRPr lang="en-US" dirty="0"/>
-          </a:p>
-        </p:txBody>
-      </p:sp>
-      <p:sp>
-        <p:nvSpPr>
-          <p:cNvPr id="6" name="Rounded Rectangle 5"/>
-          <p:cNvSpPr/>
-          <p:nvPr/>
-        </p:nvSpPr>
-        <p:spPr>
-          <a:xfrm>
-            <a:off x="166777" y="1992161"/>
-            <a:ext cx="1593011" cy="680851"/>
-          </a:xfrm>
-          <a:prstGeom prst="roundRect">
-            <a:avLst/>
-          </a:prstGeom>
-        </p:spPr>
-        <p:style>
-          <a:lnRef idx="1">
-            <a:schemeClr val="accent1"/>
-          </a:lnRef>
-          <a:fillRef idx="2">
-            <a:schemeClr val="accent1"/>
-          </a:fillRef>
-          <a:effectRef idx="1">
-            <a:schemeClr val="accent1"/>
-          </a:effectRef>
-          <a:fontRef idx="minor">
-            <a:schemeClr val="dk1"/>
-          </a:fontRef>
-        </p:style>
-        <p:txBody>
-          <a:bodyPr rtlCol="0" anchor="ctr"/>
-          <a:lstStyle/>
-          <a:p>
-            <a:pPr algn="ctr"/>
-            <a:r>
-              <a:rPr lang="en-US" dirty="0" smtClean="0"/>
-              <a:t>Raw test data</a:t>
-            </a:r>
-            <a:endParaRPr lang="en-US" dirty="0"/>
-          </a:p>
-        </p:txBody>
-      </p:sp>
-      <p:sp>
-        <p:nvSpPr>
-          <p:cNvPr id="19" name="Rounded Rectangle 18"/>
-          <p:cNvSpPr/>
-          <p:nvPr/>
-        </p:nvSpPr>
-        <p:spPr>
-          <a:xfrm>
-            <a:off x="3164481" y="1992161"/>
-            <a:ext cx="1593011" cy="680851"/>
-          </a:xfrm>
-          <a:prstGeom prst="roundRect">
-            <a:avLst/>
-          </a:prstGeom>
-        </p:spPr>
-        <p:style>
-          <a:lnRef idx="1">
-            <a:schemeClr val="accent1"/>
-          </a:lnRef>
-          <a:fillRef idx="2">
-            <a:schemeClr val="accent1"/>
-          </a:fillRef>
-          <a:effectRef idx="1">
-            <a:schemeClr val="accent1"/>
-          </a:effectRef>
-          <a:fontRef idx="minor">
-            <a:schemeClr val="dk1"/>
-          </a:fontRef>
-        </p:style>
-        <p:txBody>
-          <a:bodyPr rtlCol="0" anchor="ctr"/>
-          <a:lstStyle/>
-          <a:p>
-            <a:pPr algn="ctr"/>
-            <a:r>
-              <a:rPr lang="en-US" smtClean="0"/>
-              <a:t>Input X</a:t>
-            </a:r>
-            <a:endParaRPr lang="en-US" dirty="0"/>
-          </a:p>
-        </p:txBody>
-      </p:sp>
-      <p:sp>
-        <p:nvSpPr>
-          <p:cNvPr id="20" name="Rounded Rectangle 19"/>
-          <p:cNvSpPr/>
-          <p:nvPr/>
-        </p:nvSpPr>
-        <p:spPr>
-          <a:xfrm>
-            <a:off x="6461185" y="1992161"/>
-            <a:ext cx="1593011" cy="680851"/>
-          </a:xfrm>
-          <a:prstGeom prst="roundRect">
-            <a:avLst/>
-          </a:prstGeom>
-        </p:spPr>
-        <p:style>
-          <a:lnRef idx="1">
-            <a:schemeClr val="accent1"/>
-          </a:lnRef>
-          <a:fillRef idx="2">
-            <a:schemeClr val="accent1"/>
-          </a:fillRef>
-          <a:effectRef idx="1">
-            <a:schemeClr val="accent1"/>
-          </a:effectRef>
-          <a:fontRef idx="minor">
-            <a:schemeClr val="dk1"/>
-          </a:fontRef>
-        </p:style>
-        <p:txBody>
-          <a:bodyPr rtlCol="0" anchor="ctr"/>
-          <a:lstStyle/>
-          <a:p>
-            <a:pPr algn="ctr"/>
-            <a:r>
-              <a:rPr lang="en-US" smtClean="0"/>
-              <a:t>Encoded input X</a:t>
-            </a:r>
-            <a:endParaRPr lang="en-US" dirty="0"/>
-          </a:p>
-        </p:txBody>
-      </p:sp>
-      <p:sp>
-        <p:nvSpPr>
-          <p:cNvPr id="21" name="Rounded Rectangle 20"/>
-          <p:cNvSpPr/>
-          <p:nvPr/>
-        </p:nvSpPr>
-        <p:spPr>
-          <a:xfrm>
-            <a:off x="3164480" y="3439252"/>
-            <a:ext cx="1593011" cy="680851"/>
-          </a:xfrm>
-          <a:prstGeom prst="roundRect">
-            <a:avLst/>
-          </a:prstGeom>
-        </p:spPr>
-        <p:style>
-          <a:lnRef idx="1">
-            <a:schemeClr val="accent1"/>
-          </a:lnRef>
-          <a:fillRef idx="2">
-            <a:schemeClr val="accent1"/>
-          </a:fillRef>
-          <a:effectRef idx="1">
-            <a:schemeClr val="accent1"/>
-          </a:effectRef>
-          <a:fontRef idx="minor">
-            <a:schemeClr val="dk1"/>
-          </a:fontRef>
-        </p:style>
-        <p:txBody>
-          <a:bodyPr rtlCol="0" anchor="ctr"/>
-          <a:lstStyle/>
-          <a:p>
-            <a:pPr algn="ctr"/>
-            <a:r>
-              <a:rPr lang="en-US" dirty="0" smtClean="0"/>
-              <a:t>Ground truth Y</a:t>
-            </a:r>
-            <a:endParaRPr lang="en-US" dirty="0"/>
-          </a:p>
-        </p:txBody>
-      </p:sp>
-      <p:sp>
-        <p:nvSpPr>
-          <p:cNvPr id="22" name="Rounded Rectangle 21"/>
-          <p:cNvSpPr/>
-          <p:nvPr/>
-        </p:nvSpPr>
-        <p:spPr>
-          <a:xfrm>
-            <a:off x="9724843" y="1992161"/>
-            <a:ext cx="1593011" cy="680851"/>
-          </a:xfrm>
-          <a:prstGeom prst="roundRect">
-            <a:avLst/>
-          </a:prstGeom>
-        </p:spPr>
-        <p:style>
-          <a:lnRef idx="1">
-            <a:schemeClr val="accent1"/>
-          </a:lnRef>
-          <a:fillRef idx="2">
-            <a:schemeClr val="accent1"/>
-          </a:fillRef>
-          <a:effectRef idx="1">
-            <a:schemeClr val="accent1"/>
-          </a:effectRef>
-          <a:fontRef idx="minor">
-            <a:schemeClr val="dk1"/>
-          </a:fontRef>
-        </p:style>
-        <p:txBody>
-          <a:bodyPr rtlCol="0" anchor="ctr"/>
-          <a:lstStyle/>
-          <a:p>
-            <a:pPr algn="ctr"/>
-            <a:r>
-              <a:rPr lang="en-US" dirty="0" smtClean="0"/>
-              <a:t>Encoded prediction Y</a:t>
-            </a:r>
-            <a:endParaRPr lang="en-US" dirty="0"/>
-          </a:p>
-        </p:txBody>
-      </p:sp>
-      <p:sp>
-        <p:nvSpPr>
-          <p:cNvPr id="23" name="Rounded Rectangle 22"/>
-          <p:cNvSpPr/>
-          <p:nvPr/>
-        </p:nvSpPr>
-        <p:spPr>
-          <a:xfrm>
-            <a:off x="7257690" y="3422337"/>
-            <a:ext cx="1593011" cy="680851"/>
-          </a:xfrm>
-          <a:prstGeom prst="roundRect">
-            <a:avLst/>
-          </a:prstGeom>
-        </p:spPr>
-        <p:style>
-          <a:lnRef idx="1">
-            <a:schemeClr val="accent1"/>
-          </a:lnRef>
-          <a:fillRef idx="2">
-            <a:schemeClr val="accent1"/>
-          </a:fillRef>
-          <a:effectRef idx="1">
-            <a:schemeClr val="accent1"/>
-          </a:effectRef>
-          <a:fontRef idx="minor">
-            <a:schemeClr val="dk1"/>
-          </a:fontRef>
-        </p:style>
-        <p:txBody>
-          <a:bodyPr rtlCol="0" anchor="ctr"/>
-          <a:lstStyle/>
-          <a:p>
-            <a:pPr algn="ctr"/>
-            <a:r>
-              <a:rPr lang="en-US" dirty="0" smtClean="0"/>
-              <a:t>Predicted Y</a:t>
-            </a:r>
-            <a:endParaRPr lang="en-US" dirty="0"/>
-          </a:p>
-        </p:txBody>
-      </p:sp>
-      <p:cxnSp>
-        <p:nvCxnSpPr>
-          <p:cNvPr id="10" name="Straight Arrow Connector 9"/>
-          <p:cNvCxnSpPr>
-            <a:stCxn id="6" idx="3"/>
-            <a:endCxn id="19" idx="1"/>
-          </p:cNvCxnSpPr>
-          <p:nvPr/>
-        </p:nvCxnSpPr>
-        <p:spPr>
-          <a:xfrm>
-            <a:off x="1759788" y="2332587"/>
-            <a:ext cx="1404693" cy="0"/>
-          </a:xfrm>
-          <a:prstGeom prst="straightConnector1">
-            <a:avLst/>
-          </a:prstGeom>
-          <a:ln>
-            <a:tailEnd type="triangle"/>
-          </a:ln>
-        </p:spPr>
-        <p:style>
-          <a:lnRef idx="1">
-            <a:schemeClr val="accent1"/>
-          </a:lnRef>
-          <a:fillRef idx="0">
-            <a:schemeClr val="accent1"/>
-          </a:fillRef>
-          <a:effectRef idx="0">
-            <a:schemeClr val="accent1"/>
-          </a:effectRef>
-          <a:fontRef idx="minor">
-            <a:schemeClr val="tx1"/>
-          </a:fontRef>
-        </p:style>
-      </p:cxnSp>
-      <p:cxnSp>
-        <p:nvCxnSpPr>
-          <p:cNvPr id="12" name="Straight Arrow Connector 11"/>
-          <p:cNvCxnSpPr>
-            <a:stCxn id="6" idx="3"/>
-            <a:endCxn id="21" idx="1"/>
-          </p:cNvCxnSpPr>
-          <p:nvPr/>
-        </p:nvCxnSpPr>
-        <p:spPr>
-          <a:xfrm>
-            <a:off x="1759788" y="2332587"/>
-            <a:ext cx="1404692" cy="1447091"/>
-          </a:xfrm>
-          <a:prstGeom prst="straightConnector1">
-            <a:avLst/>
-          </a:prstGeom>
-          <a:ln>
-            <a:tailEnd type="triangle"/>
-          </a:ln>
-        </p:spPr>
-        <p:style>
-          <a:lnRef idx="1">
-            <a:schemeClr val="accent1"/>
-          </a:lnRef>
-          <a:fillRef idx="0">
-            <a:schemeClr val="accent1"/>
-          </a:fillRef>
-          <a:effectRef idx="0">
-            <a:schemeClr val="accent1"/>
-          </a:effectRef>
-          <a:fontRef idx="minor">
-            <a:schemeClr val="tx1"/>
-          </a:fontRef>
-        </p:style>
-      </p:cxnSp>
-      <p:cxnSp>
-        <p:nvCxnSpPr>
-          <p:cNvPr id="14" name="Straight Arrow Connector 13"/>
-          <p:cNvCxnSpPr>
-            <a:stCxn id="19" idx="3"/>
-            <a:endCxn id="20" idx="1"/>
-          </p:cNvCxnSpPr>
-          <p:nvPr/>
-        </p:nvCxnSpPr>
-        <p:spPr>
-          <a:xfrm>
-            <a:off x="4757492" y="2332587"/>
-            <a:ext cx="1703693" cy="0"/>
-          </a:xfrm>
-          <a:prstGeom prst="straightConnector1">
-            <a:avLst/>
-          </a:prstGeom>
-          <a:ln>
-            <a:tailEnd type="triangle"/>
-          </a:ln>
-        </p:spPr>
-        <p:style>
-          <a:lnRef idx="1">
-            <a:schemeClr val="accent1"/>
-          </a:lnRef>
-          <a:fillRef idx="0">
-            <a:schemeClr val="accent1"/>
-          </a:fillRef>
-          <a:effectRef idx="0">
-            <a:schemeClr val="accent1"/>
-          </a:effectRef>
-          <a:fontRef idx="minor">
-            <a:schemeClr val="tx1"/>
-          </a:fontRef>
-        </p:style>
-      </p:cxnSp>
-      <p:cxnSp>
-        <p:nvCxnSpPr>
-          <p:cNvPr id="24" name="Straight Arrow Connector 23"/>
-          <p:cNvCxnSpPr>
-            <a:stCxn id="20" idx="3"/>
-            <a:endCxn id="22" idx="1"/>
-          </p:cNvCxnSpPr>
-          <p:nvPr/>
-        </p:nvCxnSpPr>
-        <p:spPr>
-          <a:xfrm>
-            <a:off x="8054196" y="2332587"/>
-            <a:ext cx="1670647" cy="0"/>
-          </a:xfrm>
-          <a:prstGeom prst="straightConnector1">
-            <a:avLst/>
-          </a:prstGeom>
-          <a:ln>
-            <a:tailEnd type="triangle"/>
-          </a:ln>
-        </p:spPr>
-        <p:style>
-          <a:lnRef idx="1">
-            <a:schemeClr val="accent1"/>
-          </a:lnRef>
-          <a:fillRef idx="0">
-            <a:schemeClr val="accent1"/>
-          </a:fillRef>
-          <a:effectRef idx="0">
-            <a:schemeClr val="accent1"/>
-          </a:effectRef>
-          <a:fontRef idx="minor">
-            <a:schemeClr val="tx1"/>
-          </a:fontRef>
-        </p:style>
-      </p:cxnSp>
-      <p:cxnSp>
-        <p:nvCxnSpPr>
-          <p:cNvPr id="28" name="Elbow Connector 27"/>
-          <p:cNvCxnSpPr>
-            <a:stCxn id="22" idx="2"/>
-            <a:endCxn id="23" idx="3"/>
-          </p:cNvCxnSpPr>
-          <p:nvPr/>
-        </p:nvCxnSpPr>
-        <p:spPr>
-          <a:xfrm rot="5400000">
-            <a:off x="9141150" y="2382563"/>
-            <a:ext cx="1089751" cy="1670648"/>
-          </a:xfrm>
-          <a:prstGeom prst="bentConnector2">
-            <a:avLst/>
-          </a:prstGeom>
-          <a:ln>
-            <a:tailEnd type="triangle"/>
-          </a:ln>
-        </p:spPr>
-        <p:style>
-          <a:lnRef idx="1">
-            <a:schemeClr val="accent1"/>
-          </a:lnRef>
-          <a:fillRef idx="0">
-            <a:schemeClr val="accent1"/>
-          </a:fillRef>
-          <a:effectRef idx="0">
-            <a:schemeClr val="accent1"/>
-          </a:effectRef>
-          <a:fontRef idx="minor">
-            <a:schemeClr val="tx1"/>
-          </a:fontRef>
-        </p:style>
-      </p:cxnSp>
-      <p:sp>
-        <p:nvSpPr>
-          <p:cNvPr id="39" name="TextBox 38"/>
-          <p:cNvSpPr txBox="1"/>
-          <p:nvPr/>
-        </p:nvSpPr>
-        <p:spPr>
-          <a:xfrm>
-            <a:off x="2901396" y="5467918"/>
-            <a:ext cx="1831676" cy="369332"/>
-          </a:xfrm>
-          <a:prstGeom prst="rect">
-            <a:avLst/>
-          </a:prstGeom>
-          <a:noFill/>
-        </p:spPr>
-        <p:txBody>
-          <a:bodyPr wrap="square" rtlCol="0">
-            <a:spAutoFit/>
-          </a:bodyPr>
-          <a:lstStyle/>
-          <a:p>
-            <a:r>
-              <a:rPr lang="en-US" smtClean="0"/>
-              <a:t>Evaluation</a:t>
-            </a:r>
-            <a:endParaRPr lang="en-US" dirty="0"/>
-          </a:p>
-        </p:txBody>
-      </p:sp>
-      <p:sp>
-        <p:nvSpPr>
-          <p:cNvPr id="40" name="TextBox 39"/>
-          <p:cNvSpPr txBox="1"/>
-          <p:nvPr/>
-        </p:nvSpPr>
-        <p:spPr>
-          <a:xfrm>
-            <a:off x="8925437" y="3714072"/>
-            <a:ext cx="2976137" cy="646331"/>
-          </a:xfrm>
-          <a:prstGeom prst="rect">
-            <a:avLst/>
-          </a:prstGeom>
-          <a:noFill/>
-        </p:spPr>
-        <p:txBody>
-          <a:bodyPr wrap="square" rtlCol="0">
-            <a:spAutoFit/>
-          </a:bodyPr>
-          <a:lstStyle/>
-          <a:p>
-            <a:r>
-              <a:rPr lang="en-US" dirty="0" smtClean="0"/>
-              <a:t>Inverse transform label</a:t>
-            </a:r>
-          </a:p>
-          <a:p>
-            <a:r>
-              <a:rPr lang="en-US" dirty="0" smtClean="0"/>
-              <a:t>(inverse-encode/normalize)</a:t>
-            </a:r>
-            <a:endParaRPr lang="en-US" dirty="0"/>
-          </a:p>
-        </p:txBody>
-      </p:sp>
-      <p:sp>
-        <p:nvSpPr>
-          <p:cNvPr id="41" name="Rounded Rectangle 40"/>
-          <p:cNvSpPr/>
-          <p:nvPr/>
-        </p:nvSpPr>
-        <p:spPr>
-          <a:xfrm>
-            <a:off x="1788566" y="4545918"/>
-            <a:ext cx="1593011" cy="680851"/>
-          </a:xfrm>
-          <a:prstGeom prst="roundRect">
-            <a:avLst/>
-          </a:prstGeom>
-        </p:spPr>
-        <p:style>
-          <a:lnRef idx="1">
-            <a:schemeClr val="accent1"/>
-          </a:lnRef>
-          <a:fillRef idx="2">
-            <a:schemeClr val="accent1"/>
-          </a:fillRef>
-          <a:effectRef idx="1">
-            <a:schemeClr val="accent1"/>
-          </a:effectRef>
-          <a:fontRef idx="minor">
-            <a:schemeClr val="dk1"/>
-          </a:fontRef>
-        </p:style>
-        <p:txBody>
-          <a:bodyPr rtlCol="0" anchor="ctr"/>
-          <a:lstStyle/>
-          <a:p>
-            <a:pPr algn="ctr"/>
-            <a:r>
-              <a:rPr lang="en-US" dirty="0" smtClean="0"/>
-              <a:t>Ground truth activity</a:t>
-            </a:r>
-            <a:endParaRPr lang="en-US" dirty="0"/>
-          </a:p>
-        </p:txBody>
-      </p:sp>
-      <p:sp>
-        <p:nvSpPr>
-          <p:cNvPr id="42" name="Rounded Rectangle 41"/>
-          <p:cNvSpPr/>
-          <p:nvPr/>
-        </p:nvSpPr>
-        <p:spPr>
-          <a:xfrm>
-            <a:off x="4339110" y="4545918"/>
-            <a:ext cx="1593011" cy="680851"/>
-          </a:xfrm>
-          <a:prstGeom prst="roundRect">
-            <a:avLst/>
-          </a:prstGeom>
-        </p:spPr>
-        <p:style>
-          <a:lnRef idx="1">
-            <a:schemeClr val="accent1"/>
-          </a:lnRef>
-          <a:fillRef idx="2">
-            <a:schemeClr val="accent1"/>
-          </a:fillRef>
-          <a:effectRef idx="1">
-            <a:schemeClr val="accent1"/>
-          </a:effectRef>
-          <a:fontRef idx="minor">
-            <a:schemeClr val="dk1"/>
-          </a:fontRef>
-        </p:style>
-        <p:txBody>
-          <a:bodyPr rtlCol="0" anchor="ctr"/>
-          <a:lstStyle/>
-          <a:p>
-            <a:pPr algn="ctr"/>
-            <a:r>
-              <a:rPr lang="en-US" dirty="0" smtClean="0"/>
-              <a:t>Ground truth time</a:t>
-            </a:r>
-            <a:endParaRPr lang="en-US" dirty="0"/>
-          </a:p>
-        </p:txBody>
-      </p:sp>
-      <p:sp>
-        <p:nvSpPr>
-          <p:cNvPr id="43" name="Rounded Rectangle 42"/>
-          <p:cNvSpPr/>
-          <p:nvPr/>
-        </p:nvSpPr>
-        <p:spPr>
-          <a:xfrm>
-            <a:off x="6215355" y="4545918"/>
-            <a:ext cx="1593011" cy="680851"/>
-          </a:xfrm>
-          <a:prstGeom prst="roundRect">
-            <a:avLst/>
-          </a:prstGeom>
-        </p:spPr>
-        <p:style>
-          <a:lnRef idx="1">
-            <a:schemeClr val="accent1"/>
-          </a:lnRef>
-          <a:fillRef idx="2">
-            <a:schemeClr val="accent1"/>
-          </a:fillRef>
-          <a:effectRef idx="1">
-            <a:schemeClr val="accent1"/>
-          </a:effectRef>
-          <a:fontRef idx="minor">
-            <a:schemeClr val="dk1"/>
-          </a:fontRef>
-        </p:style>
-        <p:txBody>
-          <a:bodyPr rtlCol="0" anchor="ctr"/>
-          <a:lstStyle/>
-          <a:p>
-            <a:pPr algn="ctr"/>
-            <a:r>
-              <a:rPr lang="en-US" dirty="0" smtClean="0"/>
-              <a:t>Predicted activity</a:t>
-            </a:r>
-            <a:endParaRPr lang="en-US" dirty="0"/>
-          </a:p>
-        </p:txBody>
-      </p:sp>
-      <p:sp>
-        <p:nvSpPr>
-          <p:cNvPr id="44" name="Rounded Rectangle 43"/>
-          <p:cNvSpPr/>
-          <p:nvPr/>
-        </p:nvSpPr>
-        <p:spPr>
-          <a:xfrm>
-            <a:off x="8588316" y="4545918"/>
-            <a:ext cx="1593011" cy="680851"/>
-          </a:xfrm>
-          <a:prstGeom prst="roundRect">
-            <a:avLst/>
-          </a:prstGeom>
-        </p:spPr>
-        <p:style>
-          <a:lnRef idx="1">
-            <a:schemeClr val="accent1"/>
-          </a:lnRef>
-          <a:fillRef idx="2">
-            <a:schemeClr val="accent1"/>
-          </a:fillRef>
-          <a:effectRef idx="1">
-            <a:schemeClr val="accent1"/>
-          </a:effectRef>
-          <a:fontRef idx="minor">
-            <a:schemeClr val="dk1"/>
-          </a:fontRef>
-        </p:style>
-        <p:txBody>
-          <a:bodyPr rtlCol="0" anchor="ctr"/>
-          <a:lstStyle/>
-          <a:p>
-            <a:pPr algn="ctr"/>
-            <a:r>
-              <a:rPr lang="en-US" dirty="0" smtClean="0"/>
-              <a:t>Predicted time</a:t>
-            </a:r>
-            <a:endParaRPr lang="en-US" dirty="0"/>
-          </a:p>
-        </p:txBody>
-      </p:sp>
-      <p:cxnSp>
-        <p:nvCxnSpPr>
-          <p:cNvPr id="34" name="Straight Arrow Connector 33"/>
-          <p:cNvCxnSpPr>
-            <a:stCxn id="21" idx="2"/>
-            <a:endCxn id="41" idx="0"/>
-          </p:cNvCxnSpPr>
-          <p:nvPr/>
-        </p:nvCxnSpPr>
-        <p:spPr>
-          <a:xfrm flipH="1">
-            <a:off x="2585072" y="4120103"/>
-            <a:ext cx="1375914" cy="425815"/>
-          </a:xfrm>
-          <a:prstGeom prst="straightConnector1">
-            <a:avLst/>
-          </a:prstGeom>
-          <a:ln>
-            <a:tailEnd type="triangle"/>
-          </a:ln>
-        </p:spPr>
-        <p:style>
-          <a:lnRef idx="1">
-            <a:schemeClr val="accent1"/>
-          </a:lnRef>
-          <a:fillRef idx="0">
-            <a:schemeClr val="accent1"/>
-          </a:fillRef>
-          <a:effectRef idx="0">
-            <a:schemeClr val="accent1"/>
-          </a:effectRef>
-          <a:fontRef idx="minor">
-            <a:schemeClr val="tx1"/>
-          </a:fontRef>
-        </p:style>
-      </p:cxnSp>
-      <p:cxnSp>
-        <p:nvCxnSpPr>
-          <p:cNvPr id="46" name="Straight Arrow Connector 45"/>
-          <p:cNvCxnSpPr>
-            <a:stCxn id="21" idx="2"/>
-            <a:endCxn id="42" idx="0"/>
-          </p:cNvCxnSpPr>
-          <p:nvPr/>
-        </p:nvCxnSpPr>
-        <p:spPr>
-          <a:xfrm>
-            <a:off x="3960986" y="4120103"/>
-            <a:ext cx="1174630" cy="425815"/>
-          </a:xfrm>
-          <a:prstGeom prst="straightConnector1">
-            <a:avLst/>
-          </a:prstGeom>
-          <a:ln>
-            <a:tailEnd type="triangle"/>
-          </a:ln>
-        </p:spPr>
-        <p:style>
-          <a:lnRef idx="1">
-            <a:schemeClr val="accent1"/>
-          </a:lnRef>
-          <a:fillRef idx="0">
-            <a:schemeClr val="accent1"/>
-          </a:fillRef>
-          <a:effectRef idx="0">
-            <a:schemeClr val="accent1"/>
-          </a:effectRef>
-          <a:fontRef idx="minor">
-            <a:schemeClr val="tx1"/>
-          </a:fontRef>
-        </p:style>
-      </p:cxnSp>
-      <p:cxnSp>
-        <p:nvCxnSpPr>
-          <p:cNvPr id="48" name="Straight Arrow Connector 47"/>
-          <p:cNvCxnSpPr>
-            <a:stCxn id="23" idx="2"/>
-            <a:endCxn id="43" idx="0"/>
-          </p:cNvCxnSpPr>
-          <p:nvPr/>
-        </p:nvCxnSpPr>
-        <p:spPr>
-          <a:xfrm flipH="1">
-            <a:off x="7011861" y="4103188"/>
-            <a:ext cx="1042335" cy="442730"/>
-          </a:xfrm>
-          <a:prstGeom prst="straightConnector1">
-            <a:avLst/>
-          </a:prstGeom>
-          <a:ln>
-            <a:tailEnd type="triangle"/>
-          </a:ln>
-        </p:spPr>
-        <p:style>
-          <a:lnRef idx="1">
-            <a:schemeClr val="accent1"/>
-          </a:lnRef>
-          <a:fillRef idx="0">
-            <a:schemeClr val="accent1"/>
-          </a:fillRef>
-          <a:effectRef idx="0">
-            <a:schemeClr val="accent1"/>
-          </a:effectRef>
-          <a:fontRef idx="minor">
-            <a:schemeClr val="tx1"/>
-          </a:fontRef>
-        </p:style>
-      </p:cxnSp>
-      <p:cxnSp>
-        <p:nvCxnSpPr>
-          <p:cNvPr id="50" name="Straight Arrow Connector 49"/>
-          <p:cNvCxnSpPr>
-            <a:stCxn id="23" idx="2"/>
-            <a:endCxn id="44" idx="0"/>
-          </p:cNvCxnSpPr>
-          <p:nvPr/>
-        </p:nvCxnSpPr>
-        <p:spPr>
-          <a:xfrm>
-            <a:off x="8054196" y="4103188"/>
-            <a:ext cx="1330626" cy="442730"/>
-          </a:xfrm>
-          <a:prstGeom prst="straightConnector1">
-            <a:avLst/>
-          </a:prstGeom>
-          <a:ln>
-            <a:tailEnd type="triangle"/>
-          </a:ln>
-        </p:spPr>
-        <p:style>
-          <a:lnRef idx="1">
-            <a:schemeClr val="accent1"/>
-          </a:lnRef>
-          <a:fillRef idx="0">
-            <a:schemeClr val="accent1"/>
-          </a:fillRef>
-          <a:effectRef idx="0">
-            <a:schemeClr val="accent1"/>
-          </a:effectRef>
-          <a:fontRef idx="minor">
-            <a:schemeClr val="tx1"/>
-          </a:fontRef>
-        </p:style>
-      </p:cxnSp>
-      <p:cxnSp>
-        <p:nvCxnSpPr>
-          <p:cNvPr id="54" name="Elbow Connector 53"/>
-          <p:cNvCxnSpPr>
-            <a:stCxn id="41" idx="2"/>
-            <a:endCxn id="43" idx="2"/>
-          </p:cNvCxnSpPr>
-          <p:nvPr/>
-        </p:nvCxnSpPr>
-        <p:spPr>
-          <a:xfrm rot="16200000" flipH="1">
-            <a:off x="4798466" y="3013374"/>
-            <a:ext cx="12700" cy="4426789"/>
-          </a:xfrm>
-          <a:prstGeom prst="bentConnector3">
-            <a:avLst>
-              <a:gd name="adj1" fmla="val 1800000"/>
-            </a:avLst>
-          </a:prstGeom>
-          <a:ln>
-            <a:prstDash val="dash"/>
-          </a:ln>
-        </p:spPr>
-        <p:style>
-          <a:lnRef idx="2">
-            <a:schemeClr val="accent2"/>
-          </a:lnRef>
-          <a:fillRef idx="0">
-            <a:schemeClr val="accent2"/>
-          </a:fillRef>
-          <a:effectRef idx="1">
-            <a:schemeClr val="accent2"/>
-          </a:effectRef>
-          <a:fontRef idx="minor">
-            <a:schemeClr val="tx1"/>
-          </a:fontRef>
-        </p:style>
-      </p:cxnSp>
-      <p:cxnSp>
-        <p:nvCxnSpPr>
-          <p:cNvPr id="58" name="Elbow Connector 57"/>
-          <p:cNvCxnSpPr>
-            <a:stCxn id="42" idx="2"/>
-            <a:endCxn id="44" idx="2"/>
-          </p:cNvCxnSpPr>
-          <p:nvPr/>
-        </p:nvCxnSpPr>
-        <p:spPr>
-          <a:xfrm rot="16200000" flipH="1">
-            <a:off x="7260219" y="3102166"/>
-            <a:ext cx="12700" cy="4249206"/>
-          </a:xfrm>
-          <a:prstGeom prst="bentConnector3">
-            <a:avLst>
-              <a:gd name="adj1" fmla="val 3022638"/>
-            </a:avLst>
-          </a:prstGeom>
-          <a:ln>
-            <a:prstDash val="dash"/>
-          </a:ln>
-        </p:spPr>
-        <p:style>
-          <a:lnRef idx="2">
-            <a:schemeClr val="accent2"/>
-          </a:lnRef>
-          <a:fillRef idx="0">
-            <a:schemeClr val="accent2"/>
-          </a:fillRef>
-          <a:effectRef idx="1">
-            <a:schemeClr val="accent2"/>
-          </a:effectRef>
-          <a:fontRef idx="minor">
-            <a:schemeClr val="tx1"/>
-          </a:fontRef>
-        </p:style>
-      </p:cxnSp>
-      <p:sp>
-        <p:nvSpPr>
-          <p:cNvPr id="63" name="TextBox 62"/>
-          <p:cNvSpPr txBox="1"/>
-          <p:nvPr/>
-        </p:nvSpPr>
-        <p:spPr>
-          <a:xfrm>
-            <a:off x="8206596" y="2008572"/>
-            <a:ext cx="1831676" cy="369332"/>
-          </a:xfrm>
-          <a:prstGeom prst="rect">
-            <a:avLst/>
-          </a:prstGeom>
-          <a:noFill/>
-        </p:spPr>
-        <p:txBody>
-          <a:bodyPr wrap="square" rtlCol="0">
-            <a:spAutoFit/>
-          </a:bodyPr>
-          <a:lstStyle/>
-          <a:p>
-            <a:r>
-              <a:rPr lang="en-US" dirty="0" smtClean="0"/>
-              <a:t>Predict model</a:t>
-            </a:r>
-            <a:endParaRPr lang="en-US" dirty="0"/>
-          </a:p>
-        </p:txBody>
-      </p:sp>
-      <p:sp>
-        <p:nvSpPr>
-          <p:cNvPr id="64" name="TextBox 63"/>
-          <p:cNvSpPr txBox="1"/>
-          <p:nvPr/>
-        </p:nvSpPr>
-        <p:spPr>
-          <a:xfrm>
-            <a:off x="7808366" y="5635669"/>
-            <a:ext cx="1831676" cy="369332"/>
-          </a:xfrm>
-          <a:prstGeom prst="rect">
-            <a:avLst/>
-          </a:prstGeom>
-          <a:noFill/>
-        </p:spPr>
-        <p:txBody>
-          <a:bodyPr wrap="square" rtlCol="0">
-            <a:spAutoFit/>
-          </a:bodyPr>
-          <a:lstStyle/>
-          <a:p>
-            <a:r>
-              <a:rPr lang="en-US" smtClean="0"/>
-              <a:t>Evaluation</a:t>
-            </a:r>
-            <a:endParaRPr lang="en-US" dirty="0"/>
-          </a:p>
-        </p:txBody>
-      </p:sp>
+      <p:pic>
+        <p:nvPicPr>
+          <p:cNvPr id="3" name="Picture 2"/>
+          <p:cNvPicPr>
+            <a:picLocks noChangeAspect="1"/>
+          </p:cNvPicPr>
+          <p:nvPr/>
+        </p:nvPicPr>
+        <p:blipFill>
+          <a:blip r:embed="rId2">
+            <a:extLst>
+              <a:ext uri="{28A0092B-C50C-407E-A947-70E740481C1C}">
+                <a14:useLocalDpi xmlns:a14="http://schemas.microsoft.com/office/drawing/2010/main" val="0"/>
+              </a:ext>
+            </a:extLst>
+          </a:blip>
+          <a:stretch>
+            <a:fillRect/>
+          </a:stretch>
+        </p:blipFill>
+        <p:spPr>
+          <a:xfrm>
+            <a:off x="399738" y="4050044"/>
+            <a:ext cx="5321300" cy="495300"/>
+          </a:xfrm>
+          <a:prstGeom prst="rect">
+            <a:avLst/>
+          </a:prstGeom>
+        </p:spPr>
+      </p:pic>
+      <p:pic>
+        <p:nvPicPr>
+          <p:cNvPr id="6" name="Picture 5"/>
+          <p:cNvPicPr>
+            <a:picLocks noChangeAspect="1"/>
+          </p:cNvPicPr>
+          <p:nvPr/>
+        </p:nvPicPr>
+        <p:blipFill>
+          <a:blip r:embed="rId3">
+            <a:extLst>
+              <a:ext uri="{28A0092B-C50C-407E-A947-70E740481C1C}">
+                <a14:useLocalDpi xmlns:a14="http://schemas.microsoft.com/office/drawing/2010/main" val="0"/>
+              </a:ext>
+            </a:extLst>
+          </a:blip>
+          <a:stretch>
+            <a:fillRect/>
+          </a:stretch>
+        </p:blipFill>
+        <p:spPr>
+          <a:xfrm>
+            <a:off x="463550" y="749508"/>
+            <a:ext cx="5626100" cy="863600"/>
+          </a:xfrm>
+          <a:prstGeom prst="rect">
+            <a:avLst/>
+          </a:prstGeom>
+        </p:spPr>
+      </p:pic>
+      <p:pic>
+        <p:nvPicPr>
+          <p:cNvPr id="9" name="Picture 8"/>
+          <p:cNvPicPr>
+            <a:picLocks noChangeAspect="1"/>
+          </p:cNvPicPr>
+          <p:nvPr/>
+        </p:nvPicPr>
+        <p:blipFill>
+          <a:blip r:embed="rId4">
+            <a:extLst>
+              <a:ext uri="{28A0092B-C50C-407E-A947-70E740481C1C}">
+                <a14:useLocalDpi xmlns:a14="http://schemas.microsoft.com/office/drawing/2010/main" val="0"/>
+              </a:ext>
+            </a:extLst>
+          </a:blip>
+          <a:stretch>
+            <a:fillRect/>
+          </a:stretch>
+        </p:blipFill>
+        <p:spPr>
+          <a:xfrm>
+            <a:off x="479181" y="1613108"/>
+            <a:ext cx="5067300" cy="825500"/>
+          </a:xfrm>
+          <a:prstGeom prst="rect">
+            <a:avLst/>
+          </a:prstGeom>
+        </p:spPr>
+      </p:pic>
+      <p:pic>
+        <p:nvPicPr>
+          <p:cNvPr id="10" name="Picture 9"/>
+          <p:cNvPicPr>
+            <a:picLocks noChangeAspect="1"/>
+          </p:cNvPicPr>
+          <p:nvPr/>
+        </p:nvPicPr>
+        <p:blipFill>
+          <a:blip r:embed="rId5">
+            <a:extLst>
+              <a:ext uri="{28A0092B-C50C-407E-A947-70E740481C1C}">
+                <a14:useLocalDpi xmlns:a14="http://schemas.microsoft.com/office/drawing/2010/main" val="0"/>
+              </a:ext>
+            </a:extLst>
+          </a:blip>
+          <a:stretch>
+            <a:fillRect/>
+          </a:stretch>
+        </p:blipFill>
+        <p:spPr>
+          <a:xfrm>
+            <a:off x="463550" y="2536301"/>
+            <a:ext cx="5041900" cy="838200"/>
+          </a:xfrm>
+          <a:prstGeom prst="rect">
+            <a:avLst/>
+          </a:prstGeom>
+        </p:spPr>
+      </p:pic>
+      <p:pic>
+        <p:nvPicPr>
+          <p:cNvPr id="12" name="Picture 11"/>
+          <p:cNvPicPr>
+            <a:picLocks noChangeAspect="1"/>
+          </p:cNvPicPr>
+          <p:nvPr/>
+        </p:nvPicPr>
+        <p:blipFill>
+          <a:blip r:embed="rId6">
+            <a:extLst>
+              <a:ext uri="{28A0092B-C50C-407E-A947-70E740481C1C}">
+                <a14:useLocalDpi xmlns:a14="http://schemas.microsoft.com/office/drawing/2010/main" val="0"/>
+              </a:ext>
+            </a:extLst>
+          </a:blip>
+          <a:stretch>
+            <a:fillRect/>
+          </a:stretch>
+        </p:blipFill>
+        <p:spPr>
+          <a:xfrm>
+            <a:off x="6111943" y="749508"/>
+            <a:ext cx="3848100" cy="774700"/>
+          </a:xfrm>
+          <a:prstGeom prst="rect">
+            <a:avLst/>
+          </a:prstGeom>
+        </p:spPr>
+      </p:pic>
     </p:spTree>
     <p:extLst>
       <p:ext uri="{BB962C8B-B14F-4D97-AF65-F5344CB8AC3E}">
-        <p14:creationId xmlns:p14="http://schemas.microsoft.com/office/powerpoint/2010/main" val="1975174707"/>
+        <p14:creationId xmlns:p14="http://schemas.microsoft.com/office/powerpoint/2010/main" val="1258921001"/>
       </p:ext>
     </p:extLst>
   </p:cSld>
@@ -4506,7 +3648,7 @@
         <p:spPr>
           <a:xfrm>
             <a:off x="399738" y="162993"/>
-            <a:ext cx="9448799" cy="586515"/>
+            <a:ext cx="4488785" cy="586515"/>
           </a:xfrm>
         </p:spPr>
         <p:txBody>
@@ -4517,8 +3659,8 @@
           <a:p>
             <a:pPr algn="l"/>
             <a:r>
-              <a:rPr lang="en-US" sz="4000" b="1" dirty="0" err="1"/>
-              <a:t>evaluate_next_activity_and_time</a:t>
+              <a:rPr lang="en-US" sz="4000" b="1" dirty="0" smtClean="0"/>
+              <a:t>Training</a:t>
             </a:r>
             <a:endParaRPr lang="en-US" sz="4000" b="1" dirty="0"/>
           </a:p>
@@ -4526,7 +3668,7 @@
       </p:sp>
       <p:pic>
         <p:nvPicPr>
-          <p:cNvPr id="3" name="Picture 2"/>
+          <p:cNvPr id="4" name="Picture 3"/>
           <p:cNvPicPr>
             <a:picLocks noChangeAspect="1"/>
           </p:cNvPicPr>
@@ -4546,816 +3688,8 @@
         </p:blipFill>
         <p:spPr>
           <a:xfrm>
-            <a:off x="399738" y="749508"/>
-            <a:ext cx="5151056" cy="626480"/>
-          </a:xfrm>
-          <a:prstGeom prst="rect">
-            <a:avLst/>
-          </a:prstGeom>
-        </p:spPr>
-      </p:pic>
-      <p:pic>
-        <p:nvPicPr>
-          <p:cNvPr id="6" name="Picture 5"/>
-          <p:cNvPicPr>
-            <a:picLocks noChangeAspect="1"/>
-          </p:cNvPicPr>
-          <p:nvPr/>
-        </p:nvPicPr>
-        <p:blipFill>
-          <a:blip r:embed="rId3">
-            <a:extLst>
-              <a:ext uri="{28A0092B-C50C-407E-A947-70E740481C1C}">
-                <a14:useLocalDpi xmlns:a14="http://schemas.microsoft.com/office/drawing/2010/main" val="0"/>
-              </a:ext>
-            </a:extLst>
-          </a:blip>
-          <a:stretch>
-            <a:fillRect/>
-          </a:stretch>
-        </p:blipFill>
-        <p:spPr>
-          <a:xfrm>
-            <a:off x="399738" y="1336023"/>
-            <a:ext cx="3916251" cy="2094984"/>
-          </a:xfrm>
-          <a:prstGeom prst="rect">
-            <a:avLst/>
-          </a:prstGeom>
-        </p:spPr>
-      </p:pic>
-      <p:pic>
-        <p:nvPicPr>
-          <p:cNvPr id="9" name="Picture 8"/>
-          <p:cNvPicPr>
-            <a:picLocks noChangeAspect="1"/>
-          </p:cNvPicPr>
-          <p:nvPr/>
-        </p:nvPicPr>
-        <p:blipFill>
-          <a:blip r:embed="rId4">
-            <a:extLst>
-              <a:ext uri="{28A0092B-C50C-407E-A947-70E740481C1C}">
-                <a14:useLocalDpi xmlns:a14="http://schemas.microsoft.com/office/drawing/2010/main" val="0"/>
-              </a:ext>
-            </a:extLst>
-          </a:blip>
-          <a:stretch>
-            <a:fillRect/>
-          </a:stretch>
-        </p:blipFill>
-        <p:spPr>
-          <a:xfrm>
-            <a:off x="4260812" y="3426149"/>
-            <a:ext cx="1832504" cy="2190482"/>
-          </a:xfrm>
-          <a:prstGeom prst="rect">
-            <a:avLst/>
-          </a:prstGeom>
-        </p:spPr>
-      </p:pic>
-      <p:pic>
-        <p:nvPicPr>
-          <p:cNvPr id="10" name="Picture 9"/>
-          <p:cNvPicPr>
-            <a:picLocks noChangeAspect="1"/>
-          </p:cNvPicPr>
-          <p:nvPr/>
-        </p:nvPicPr>
-        <p:blipFill>
-          <a:blip r:embed="rId5">
-            <a:extLst>
-              <a:ext uri="{28A0092B-C50C-407E-A947-70E740481C1C}">
-                <a14:useLocalDpi xmlns:a14="http://schemas.microsoft.com/office/drawing/2010/main" val="0"/>
-              </a:ext>
-            </a:extLst>
-          </a:blip>
-          <a:stretch>
-            <a:fillRect/>
-          </a:stretch>
-        </p:blipFill>
-        <p:spPr>
-          <a:xfrm>
-            <a:off x="6060517" y="3426149"/>
-            <a:ext cx="2014909" cy="2190482"/>
-          </a:xfrm>
-          <a:prstGeom prst="rect">
-            <a:avLst/>
-          </a:prstGeom>
-        </p:spPr>
-      </p:pic>
-      <p:pic>
-        <p:nvPicPr>
-          <p:cNvPr id="11" name="Picture 10"/>
-          <p:cNvPicPr>
-            <a:picLocks noChangeAspect="1"/>
-          </p:cNvPicPr>
-          <p:nvPr/>
-        </p:nvPicPr>
-        <p:blipFill>
-          <a:blip r:embed="rId6">
-            <a:extLst>
-              <a:ext uri="{28A0092B-C50C-407E-A947-70E740481C1C}">
-                <a14:useLocalDpi xmlns:a14="http://schemas.microsoft.com/office/drawing/2010/main" val="0"/>
-              </a:ext>
-            </a:extLst>
-          </a:blip>
-          <a:stretch>
-            <a:fillRect/>
-          </a:stretch>
-        </p:blipFill>
-        <p:spPr>
-          <a:xfrm>
-            <a:off x="7958619" y="3426149"/>
-            <a:ext cx="788168" cy="2078686"/>
-          </a:xfrm>
-          <a:prstGeom prst="rect">
-            <a:avLst/>
-          </a:prstGeom>
-        </p:spPr>
-      </p:pic>
-      <p:pic>
-        <p:nvPicPr>
-          <p:cNvPr id="12" name="Picture 11"/>
-          <p:cNvPicPr>
-            <a:picLocks noChangeAspect="1"/>
-          </p:cNvPicPr>
-          <p:nvPr/>
-        </p:nvPicPr>
-        <p:blipFill>
-          <a:blip r:embed="rId7">
-            <a:extLst>
-              <a:ext uri="{28A0092B-C50C-407E-A947-70E740481C1C}">
-                <a14:useLocalDpi xmlns:a14="http://schemas.microsoft.com/office/drawing/2010/main" val="0"/>
-              </a:ext>
-            </a:extLst>
-          </a:blip>
-          <a:stretch>
-            <a:fillRect/>
-          </a:stretch>
-        </p:blipFill>
-        <p:spPr>
-          <a:xfrm>
-            <a:off x="8770041" y="3426149"/>
-            <a:ext cx="3337162" cy="2025834"/>
-          </a:xfrm>
-          <a:prstGeom prst="rect">
-            <a:avLst/>
-          </a:prstGeom>
-        </p:spPr>
-      </p:pic>
-      <p:pic>
-        <p:nvPicPr>
-          <p:cNvPr id="13" name="Picture 12"/>
-          <p:cNvPicPr>
-            <a:picLocks noChangeAspect="1"/>
-          </p:cNvPicPr>
-          <p:nvPr/>
-        </p:nvPicPr>
-        <p:blipFill>
-          <a:blip r:embed="rId8">
-            <a:extLst>
-              <a:ext uri="{28A0092B-C50C-407E-A947-70E740481C1C}">
-                <a14:useLocalDpi xmlns:a14="http://schemas.microsoft.com/office/drawing/2010/main" val="0"/>
-              </a:ext>
-            </a:extLst>
-          </a:blip>
-          <a:stretch>
-            <a:fillRect/>
-          </a:stretch>
-        </p:blipFill>
-        <p:spPr>
-          <a:xfrm>
-            <a:off x="4346785" y="2048500"/>
-            <a:ext cx="1663700" cy="698500"/>
-          </a:xfrm>
-          <a:prstGeom prst="rect">
-            <a:avLst/>
-          </a:prstGeom>
-        </p:spPr>
-      </p:pic>
-      <p:sp>
-        <p:nvSpPr>
-          <p:cNvPr id="19" name="TextBox 18"/>
-          <p:cNvSpPr txBox="1"/>
-          <p:nvPr/>
-        </p:nvSpPr>
-        <p:spPr>
-          <a:xfrm>
-            <a:off x="6095797" y="2925299"/>
-            <a:ext cx="1276662" cy="369332"/>
-          </a:xfrm>
-          <a:prstGeom prst="rect">
-            <a:avLst/>
-          </a:prstGeom>
-          <a:noFill/>
-        </p:spPr>
-        <p:txBody>
-          <a:bodyPr wrap="square" rtlCol="0">
-            <a:spAutoFit/>
-          </a:bodyPr>
-          <a:lstStyle/>
-          <a:p>
-            <a:r>
-              <a:rPr lang="en-US" b="1" dirty="0" err="1" smtClean="0"/>
-              <a:t>timeseqs</a:t>
-            </a:r>
-            <a:endParaRPr lang="en-US" b="1" dirty="0"/>
-          </a:p>
-        </p:txBody>
-      </p:sp>
-      <p:sp>
-        <p:nvSpPr>
-          <p:cNvPr id="20" name="TextBox 19"/>
-          <p:cNvSpPr txBox="1"/>
-          <p:nvPr/>
-        </p:nvSpPr>
-        <p:spPr>
-          <a:xfrm>
-            <a:off x="7846893" y="2901024"/>
-            <a:ext cx="1297351" cy="369332"/>
-          </a:xfrm>
-          <a:prstGeom prst="rect">
-            <a:avLst/>
-          </a:prstGeom>
-          <a:noFill/>
-        </p:spPr>
-        <p:txBody>
-          <a:bodyPr wrap="square" rtlCol="0">
-            <a:spAutoFit/>
-          </a:bodyPr>
-          <a:lstStyle/>
-          <a:p>
-            <a:r>
-              <a:rPr lang="en-US" b="1" dirty="0"/>
-              <a:t>t</a:t>
-            </a:r>
-            <a:r>
-              <a:rPr lang="en-US" b="1" dirty="0" smtClean="0"/>
-              <a:t>imeseqs2</a:t>
-            </a:r>
-            <a:endParaRPr lang="en-US" b="1" dirty="0"/>
-          </a:p>
-        </p:txBody>
-      </p:sp>
-      <p:sp>
-        <p:nvSpPr>
-          <p:cNvPr id="21" name="TextBox 20"/>
-          <p:cNvSpPr txBox="1"/>
-          <p:nvPr/>
-        </p:nvSpPr>
-        <p:spPr>
-          <a:xfrm>
-            <a:off x="4344700" y="2901024"/>
-            <a:ext cx="2553324" cy="369332"/>
-          </a:xfrm>
-          <a:prstGeom prst="rect">
-            <a:avLst/>
-          </a:prstGeom>
-          <a:noFill/>
-        </p:spPr>
-        <p:txBody>
-          <a:bodyPr wrap="square" rtlCol="0">
-            <a:spAutoFit/>
-          </a:bodyPr>
-          <a:lstStyle/>
-          <a:p>
-            <a:r>
-              <a:rPr lang="en-US" b="1" dirty="0" smtClean="0"/>
-              <a:t>lines</a:t>
-            </a:r>
-            <a:endParaRPr lang="en-US" b="1" dirty="0"/>
-          </a:p>
-        </p:txBody>
-      </p:sp>
-      <p:sp>
-        <p:nvSpPr>
-          <p:cNvPr id="22" name="TextBox 21"/>
-          <p:cNvSpPr txBox="1"/>
-          <p:nvPr/>
-        </p:nvSpPr>
-        <p:spPr>
-          <a:xfrm>
-            <a:off x="9494165" y="2887981"/>
-            <a:ext cx="2553324" cy="369332"/>
-          </a:xfrm>
-          <a:prstGeom prst="rect">
-            <a:avLst/>
-          </a:prstGeom>
-          <a:noFill/>
-        </p:spPr>
-        <p:txBody>
-          <a:bodyPr wrap="square" rtlCol="0">
-            <a:spAutoFit/>
-          </a:bodyPr>
-          <a:lstStyle/>
-          <a:p>
-            <a:r>
-              <a:rPr lang="en-US" b="1" dirty="0" smtClean="0"/>
-              <a:t>timeseqs3</a:t>
-            </a:r>
-            <a:endParaRPr lang="en-US" b="1" dirty="0"/>
-          </a:p>
-        </p:txBody>
-      </p:sp>
-      <p:sp>
-        <p:nvSpPr>
-          <p:cNvPr id="14" name="TextBox 13"/>
-          <p:cNvSpPr txBox="1"/>
-          <p:nvPr/>
-        </p:nvSpPr>
-        <p:spPr>
-          <a:xfrm>
-            <a:off x="399738" y="4017522"/>
-            <a:ext cx="3307532" cy="1477328"/>
-          </a:xfrm>
-          <a:prstGeom prst="rect">
-            <a:avLst/>
-          </a:prstGeom>
-          <a:noFill/>
-        </p:spPr>
-        <p:txBody>
-          <a:bodyPr wrap="square" rtlCol="0">
-            <a:spAutoFit/>
-          </a:bodyPr>
-          <a:lstStyle/>
-          <a:p>
-            <a:r>
-              <a:rPr lang="en-US" dirty="0" smtClean="0"/>
-              <a:t>Note: </a:t>
-            </a:r>
-          </a:p>
-          <a:p>
-            <a:pPr marL="285750" indent="-285750">
-              <a:buFontTx/>
-              <a:buChar char="-"/>
-            </a:pPr>
-            <a:r>
-              <a:rPr lang="en-US" dirty="0" smtClean="0"/>
-              <a:t>Shape of timeseqs2 is different </a:t>
-            </a:r>
-          </a:p>
-          <a:p>
-            <a:pPr marL="285750" indent="-285750">
-              <a:buFontTx/>
-              <a:buChar char="-"/>
-            </a:pPr>
-            <a:r>
-              <a:rPr lang="en-US" dirty="0" smtClean="0"/>
-              <a:t>Timeseq3 is the time of activity</a:t>
-            </a:r>
-            <a:endParaRPr lang="en-US" dirty="0"/>
-          </a:p>
-        </p:txBody>
-      </p:sp>
-      <p:sp>
-        <p:nvSpPr>
-          <p:cNvPr id="18" name="Right Arrow 17"/>
-          <p:cNvSpPr/>
-          <p:nvPr/>
-        </p:nvSpPr>
-        <p:spPr>
-          <a:xfrm>
-            <a:off x="4344700" y="1679168"/>
-            <a:ext cx="987154" cy="283335"/>
-          </a:xfrm>
-          <a:prstGeom prst="rightArrow">
-            <a:avLst/>
-          </a:prstGeom>
-        </p:spPr>
-        <p:style>
-          <a:lnRef idx="2">
-            <a:schemeClr val="accent1">
-              <a:shade val="50000"/>
-            </a:schemeClr>
-          </a:lnRef>
-          <a:fillRef idx="1">
-            <a:schemeClr val="accent1"/>
-          </a:fillRef>
-          <a:effectRef idx="0">
-            <a:schemeClr val="accent1"/>
-          </a:effectRef>
-          <a:fontRef idx="minor">
-            <a:schemeClr val="lt1"/>
-          </a:fontRef>
-        </p:style>
-        <p:txBody>
-          <a:bodyPr rtlCol="0" anchor="ctr"/>
-          <a:lstStyle/>
-          <a:p>
-            <a:pPr algn="ctr"/>
-            <a:endParaRPr lang="en-US"/>
-          </a:p>
-        </p:txBody>
-      </p:sp>
-      <p:sp>
-        <p:nvSpPr>
-          <p:cNvPr id="23" name="TextBox 22"/>
-          <p:cNvSpPr txBox="1"/>
-          <p:nvPr/>
-        </p:nvSpPr>
-        <p:spPr>
-          <a:xfrm>
-            <a:off x="5331854" y="1614133"/>
-            <a:ext cx="3519012" cy="369332"/>
-          </a:xfrm>
-          <a:prstGeom prst="rect">
-            <a:avLst/>
-          </a:prstGeom>
-          <a:noFill/>
-        </p:spPr>
-        <p:txBody>
-          <a:bodyPr wrap="square" rtlCol="0">
-            <a:spAutoFit/>
-          </a:bodyPr>
-          <a:lstStyle/>
-          <a:p>
-            <a:r>
-              <a:rPr lang="en-US" dirty="0" smtClean="0"/>
-              <a:t>Fold 3 </a:t>
-            </a:r>
-            <a:r>
-              <a:rPr lang="en-US" smtClean="0"/>
-              <a:t>for testing</a:t>
-            </a:r>
-            <a:endParaRPr lang="en-US"/>
-          </a:p>
-        </p:txBody>
-      </p:sp>
-      <p:pic>
-        <p:nvPicPr>
-          <p:cNvPr id="4" name="Picture 3"/>
-          <p:cNvPicPr>
-            <a:picLocks noChangeAspect="1"/>
-          </p:cNvPicPr>
-          <p:nvPr/>
-        </p:nvPicPr>
-        <p:blipFill>
-          <a:blip r:embed="rId9">
-            <a:extLst>
-              <a:ext uri="{28A0092B-C50C-407E-A947-70E740481C1C}">
-                <a14:useLocalDpi xmlns:a14="http://schemas.microsoft.com/office/drawing/2010/main" val="0"/>
-              </a:ext>
-            </a:extLst>
-          </a:blip>
-          <a:stretch>
-            <a:fillRect/>
-          </a:stretch>
-        </p:blipFill>
-        <p:spPr>
-          <a:xfrm>
-            <a:off x="7091360" y="1364238"/>
-            <a:ext cx="4925270" cy="943538"/>
-          </a:xfrm>
-          <a:prstGeom prst="rect">
-            <a:avLst/>
-          </a:prstGeom>
-        </p:spPr>
-      </p:pic>
-      <p:sp>
-        <p:nvSpPr>
-          <p:cNvPr id="5" name="Right Arrow 4"/>
-          <p:cNvSpPr/>
-          <p:nvPr/>
-        </p:nvSpPr>
-        <p:spPr>
-          <a:xfrm rot="5400000">
-            <a:off x="4547330" y="5721449"/>
-            <a:ext cx="217440" cy="124941"/>
-          </a:xfrm>
-          <a:prstGeom prst="rightArrow">
-            <a:avLst/>
-          </a:prstGeom>
-        </p:spPr>
-        <p:style>
-          <a:lnRef idx="2">
-            <a:schemeClr val="accent1">
-              <a:shade val="50000"/>
-            </a:schemeClr>
-          </a:lnRef>
-          <a:fillRef idx="1">
-            <a:schemeClr val="accent1"/>
-          </a:fillRef>
-          <a:effectRef idx="0">
-            <a:schemeClr val="accent1"/>
-          </a:effectRef>
-          <a:fontRef idx="minor">
-            <a:schemeClr val="lt1"/>
-          </a:fontRef>
-        </p:style>
-        <p:txBody>
-          <a:bodyPr rtlCol="0" anchor="ctr"/>
-          <a:lstStyle/>
-          <a:p>
-            <a:pPr algn="ctr"/>
-            <a:endParaRPr lang="en-US"/>
-          </a:p>
-        </p:txBody>
-      </p:sp>
-      <p:sp>
-        <p:nvSpPr>
-          <p:cNvPr id="24" name="TextBox 23"/>
-          <p:cNvSpPr txBox="1"/>
-          <p:nvPr/>
-        </p:nvSpPr>
-        <p:spPr>
-          <a:xfrm>
-            <a:off x="6578058" y="5618983"/>
-            <a:ext cx="1276662" cy="369332"/>
-          </a:xfrm>
-          <a:prstGeom prst="rect">
-            <a:avLst/>
-          </a:prstGeom>
-          <a:noFill/>
-        </p:spPr>
-        <p:txBody>
-          <a:bodyPr wrap="square" rtlCol="0">
-            <a:spAutoFit/>
-          </a:bodyPr>
-          <a:lstStyle/>
-          <a:p>
-            <a:r>
-              <a:rPr lang="en-US" b="1" dirty="0" err="1"/>
-              <a:t>l</a:t>
-            </a:r>
-            <a:r>
-              <a:rPr lang="en-US" b="1" dirty="0" err="1" smtClean="0"/>
-              <a:t>ines_t</a:t>
-            </a:r>
-            <a:endParaRPr lang="en-US" b="1" dirty="0"/>
-          </a:p>
-        </p:txBody>
-      </p:sp>
-      <p:sp>
-        <p:nvSpPr>
-          <p:cNvPr id="25" name="TextBox 24"/>
-          <p:cNvSpPr txBox="1"/>
-          <p:nvPr/>
-        </p:nvSpPr>
-        <p:spPr>
-          <a:xfrm>
-            <a:off x="8273436" y="5567698"/>
-            <a:ext cx="1148146" cy="369332"/>
-          </a:xfrm>
-          <a:prstGeom prst="rect">
-            <a:avLst/>
-          </a:prstGeom>
-          <a:noFill/>
-        </p:spPr>
-        <p:txBody>
-          <a:bodyPr wrap="square" rtlCol="0">
-            <a:spAutoFit/>
-          </a:bodyPr>
-          <a:lstStyle/>
-          <a:p>
-            <a:r>
-              <a:rPr lang="en-US" b="1" dirty="0" smtClean="0"/>
-              <a:t>lines_t</a:t>
-            </a:r>
-            <a:r>
-              <a:rPr lang="en-US" b="1" dirty="0"/>
-              <a:t>2</a:t>
-            </a:r>
-          </a:p>
-        </p:txBody>
-      </p:sp>
-      <p:sp>
-        <p:nvSpPr>
-          <p:cNvPr id="26" name="TextBox 25"/>
-          <p:cNvSpPr txBox="1"/>
-          <p:nvPr/>
-        </p:nvSpPr>
-        <p:spPr>
-          <a:xfrm>
-            <a:off x="4768275" y="5636551"/>
-            <a:ext cx="987154" cy="369332"/>
-          </a:xfrm>
-          <a:prstGeom prst="rect">
-            <a:avLst/>
-          </a:prstGeom>
-          <a:noFill/>
-        </p:spPr>
-        <p:txBody>
-          <a:bodyPr wrap="square" rtlCol="0">
-            <a:spAutoFit/>
-          </a:bodyPr>
-          <a:lstStyle/>
-          <a:p>
-            <a:r>
-              <a:rPr lang="en-US" b="1" dirty="0" smtClean="0"/>
-              <a:t>lines</a:t>
-            </a:r>
-            <a:endParaRPr lang="en-US" b="1" dirty="0"/>
-          </a:p>
-        </p:txBody>
-      </p:sp>
-      <p:sp>
-        <p:nvSpPr>
-          <p:cNvPr id="27" name="TextBox 26"/>
-          <p:cNvSpPr txBox="1"/>
-          <p:nvPr/>
-        </p:nvSpPr>
-        <p:spPr>
-          <a:xfrm>
-            <a:off x="10034839" y="5567698"/>
-            <a:ext cx="1298569" cy="369332"/>
-          </a:xfrm>
-          <a:prstGeom prst="rect">
-            <a:avLst/>
-          </a:prstGeom>
-          <a:noFill/>
-        </p:spPr>
-        <p:txBody>
-          <a:bodyPr wrap="square" rtlCol="0">
-            <a:spAutoFit/>
-          </a:bodyPr>
-          <a:lstStyle/>
-          <a:p>
-            <a:r>
-              <a:rPr lang="en-US" b="1" dirty="0" smtClean="0"/>
-              <a:t>lines_t</a:t>
-            </a:r>
-            <a:r>
-              <a:rPr lang="en-US" b="1" dirty="0"/>
-              <a:t>3</a:t>
-            </a:r>
-          </a:p>
-        </p:txBody>
-      </p:sp>
-      <p:sp>
-        <p:nvSpPr>
-          <p:cNvPr id="28" name="Right Arrow 27"/>
-          <p:cNvSpPr/>
-          <p:nvPr/>
-        </p:nvSpPr>
-        <p:spPr>
-          <a:xfrm rot="5400000">
-            <a:off x="6335347" y="5718280"/>
-            <a:ext cx="217440" cy="124941"/>
-          </a:xfrm>
-          <a:prstGeom prst="rightArrow">
-            <a:avLst/>
-          </a:prstGeom>
-        </p:spPr>
-        <p:style>
-          <a:lnRef idx="2">
-            <a:schemeClr val="accent1">
-              <a:shade val="50000"/>
-            </a:schemeClr>
-          </a:lnRef>
-          <a:fillRef idx="1">
-            <a:schemeClr val="accent1"/>
-          </a:fillRef>
-          <a:effectRef idx="0">
-            <a:schemeClr val="accent1"/>
-          </a:effectRef>
-          <a:fontRef idx="minor">
-            <a:schemeClr val="lt1"/>
-          </a:fontRef>
-        </p:style>
-        <p:txBody>
-          <a:bodyPr rtlCol="0" anchor="ctr"/>
-          <a:lstStyle/>
-          <a:p>
-            <a:pPr algn="ctr"/>
-            <a:endParaRPr lang="en-US"/>
-          </a:p>
-        </p:txBody>
-      </p:sp>
-      <p:sp>
-        <p:nvSpPr>
-          <p:cNvPr id="29" name="Right Arrow 28"/>
-          <p:cNvSpPr/>
-          <p:nvPr/>
-        </p:nvSpPr>
-        <p:spPr>
-          <a:xfrm rot="5400000">
-            <a:off x="8131013" y="5714454"/>
-            <a:ext cx="217440" cy="124941"/>
-          </a:xfrm>
-          <a:prstGeom prst="rightArrow">
-            <a:avLst/>
-          </a:prstGeom>
-        </p:spPr>
-        <p:style>
-          <a:lnRef idx="2">
-            <a:schemeClr val="accent1">
-              <a:shade val="50000"/>
-            </a:schemeClr>
-          </a:lnRef>
-          <a:fillRef idx="1">
-            <a:schemeClr val="accent1"/>
-          </a:fillRef>
-          <a:effectRef idx="0">
-            <a:schemeClr val="accent1"/>
-          </a:effectRef>
-          <a:fontRef idx="minor">
-            <a:schemeClr val="lt1"/>
-          </a:fontRef>
-        </p:style>
-        <p:txBody>
-          <a:bodyPr rtlCol="0" anchor="ctr"/>
-          <a:lstStyle/>
-          <a:p>
-            <a:pPr algn="ctr"/>
-            <a:endParaRPr lang="en-US"/>
-          </a:p>
-        </p:txBody>
-      </p:sp>
-      <p:sp>
-        <p:nvSpPr>
-          <p:cNvPr id="30" name="Right Arrow 29"/>
-          <p:cNvSpPr/>
-          <p:nvPr/>
-        </p:nvSpPr>
-        <p:spPr>
-          <a:xfrm rot="5400000">
-            <a:off x="9822816" y="5714454"/>
-            <a:ext cx="217440" cy="124941"/>
-          </a:xfrm>
-          <a:prstGeom prst="rightArrow">
-            <a:avLst/>
-          </a:prstGeom>
-        </p:spPr>
-        <p:style>
-          <a:lnRef idx="2">
-            <a:schemeClr val="accent1">
-              <a:shade val="50000"/>
-            </a:schemeClr>
-          </a:lnRef>
-          <a:fillRef idx="1">
-            <a:schemeClr val="accent1"/>
-          </a:fillRef>
-          <a:effectRef idx="0">
-            <a:schemeClr val="accent1"/>
-          </a:effectRef>
-          <a:fontRef idx="minor">
-            <a:schemeClr val="lt1"/>
-          </a:fontRef>
-        </p:style>
-        <p:txBody>
-          <a:bodyPr rtlCol="0" anchor="ctr"/>
-          <a:lstStyle/>
-          <a:p>
-            <a:pPr algn="ctr"/>
-            <a:endParaRPr lang="en-US"/>
-          </a:p>
-        </p:txBody>
-      </p:sp>
-      <p:pic>
-        <p:nvPicPr>
-          <p:cNvPr id="7" name="Picture 6"/>
-          <p:cNvPicPr>
-            <a:picLocks noChangeAspect="1"/>
-          </p:cNvPicPr>
-          <p:nvPr/>
-        </p:nvPicPr>
-        <p:blipFill>
-          <a:blip r:embed="rId10">
-            <a:extLst>
-              <a:ext uri="{28A0092B-C50C-407E-A947-70E740481C1C}">
-                <a14:useLocalDpi xmlns:a14="http://schemas.microsoft.com/office/drawing/2010/main" val="0"/>
-              </a:ext>
-            </a:extLst>
-          </a:blip>
-          <a:stretch>
-            <a:fillRect/>
-          </a:stretch>
-        </p:blipFill>
-        <p:spPr>
-          <a:xfrm>
-            <a:off x="83888" y="6203146"/>
-            <a:ext cx="5027756" cy="545384"/>
-          </a:xfrm>
-          <a:prstGeom prst="rect">
-            <a:avLst/>
-          </a:prstGeom>
-        </p:spPr>
-      </p:pic>
-      <p:pic>
-        <p:nvPicPr>
-          <p:cNvPr id="8" name="Picture 7"/>
-          <p:cNvPicPr>
-            <a:picLocks noChangeAspect="1"/>
-          </p:cNvPicPr>
-          <p:nvPr/>
-        </p:nvPicPr>
-        <p:blipFill>
-          <a:blip r:embed="rId11">
-            <a:extLst>
-              <a:ext uri="{28A0092B-C50C-407E-A947-70E740481C1C}">
-                <a14:useLocalDpi xmlns:a14="http://schemas.microsoft.com/office/drawing/2010/main" val="0"/>
-              </a:ext>
-            </a:extLst>
-          </a:blip>
-          <a:stretch>
-            <a:fillRect/>
-          </a:stretch>
-        </p:blipFill>
-        <p:spPr>
-          <a:xfrm>
-            <a:off x="5713814" y="6203146"/>
-            <a:ext cx="5246108" cy="547718"/>
+            <a:off x="571500" y="1168400"/>
+            <a:ext cx="10506808" cy="4304285"/>
           </a:xfrm>
           <a:prstGeom prst="rect">
             <a:avLst/>
@@ -5365,7 +3699,7 @@
     </p:spTree>
     <p:extLst>
       <p:ext uri="{BB962C8B-B14F-4D97-AF65-F5344CB8AC3E}">
-        <p14:creationId xmlns:p14="http://schemas.microsoft.com/office/powerpoint/2010/main" val="304100711"/>
+        <p14:creationId xmlns:p14="http://schemas.microsoft.com/office/powerpoint/2010/main" val="1638810575"/>
       </p:ext>
     </p:extLst>
   </p:cSld>
@@ -5416,143 +3750,342 @@
           <a:p>
             <a:pPr algn="l"/>
             <a:r>
-              <a:rPr lang="en-US" sz="4000" b="1" dirty="0" err="1"/>
-              <a:t>evaluate_suffix_and_remaining_time</a:t>
+              <a:rPr lang="en-US" sz="4000" b="1" dirty="0" smtClean="0"/>
+              <a:t>Evaluation</a:t>
             </a:r>
             <a:endParaRPr lang="en-US" sz="4000" b="1" dirty="0"/>
           </a:p>
         </p:txBody>
       </p:sp>
-      <p:pic>
-        <p:nvPicPr>
-          <p:cNvPr id="7" name="Picture 6"/>
-          <p:cNvPicPr>
-            <a:picLocks noChangeAspect="1"/>
-          </p:cNvPicPr>
-          <p:nvPr/>
-        </p:nvPicPr>
-        <p:blipFill>
-          <a:blip r:embed="rId2">
-            <a:extLst>
-              <a:ext uri="{28A0092B-C50C-407E-A947-70E740481C1C}">
-                <a14:useLocalDpi xmlns:a14="http://schemas.microsoft.com/office/drawing/2010/main" val="0"/>
-              </a:ext>
-            </a:extLst>
-          </a:blip>
-          <a:stretch>
-            <a:fillRect/>
-          </a:stretch>
-        </p:blipFill>
-        <p:spPr>
-          <a:xfrm>
-            <a:off x="399738" y="749508"/>
-            <a:ext cx="7804749" cy="2213140"/>
-          </a:xfrm>
-          <a:prstGeom prst="rect">
-            <a:avLst/>
-          </a:prstGeom>
-        </p:spPr>
-      </p:pic>
-      <p:pic>
-        <p:nvPicPr>
-          <p:cNvPr id="8" name="Picture 7"/>
-          <p:cNvPicPr>
-            <a:picLocks noChangeAspect="1"/>
-          </p:cNvPicPr>
-          <p:nvPr/>
-        </p:nvPicPr>
-        <p:blipFill>
-          <a:blip r:embed="rId3">
-            <a:extLst>
-              <a:ext uri="{28A0092B-C50C-407E-A947-70E740481C1C}">
-                <a14:useLocalDpi xmlns:a14="http://schemas.microsoft.com/office/drawing/2010/main" val="0"/>
-              </a:ext>
-            </a:extLst>
-          </a:blip>
-          <a:stretch>
-            <a:fillRect/>
-          </a:stretch>
-        </p:blipFill>
-        <p:spPr>
-          <a:xfrm>
-            <a:off x="3315467" y="3119137"/>
-            <a:ext cx="1409700" cy="698500"/>
-          </a:xfrm>
-          <a:prstGeom prst="rect">
-            <a:avLst/>
-          </a:prstGeom>
-        </p:spPr>
-      </p:pic>
-      <p:pic>
-        <p:nvPicPr>
-          <p:cNvPr id="15" name="Picture 14"/>
-          <p:cNvPicPr>
-            <a:picLocks noChangeAspect="1"/>
-          </p:cNvPicPr>
-          <p:nvPr/>
-        </p:nvPicPr>
-        <p:blipFill>
-          <a:blip r:embed="rId4">
-            <a:extLst>
-              <a:ext uri="{28A0092B-C50C-407E-A947-70E740481C1C}">
-                <a14:useLocalDpi xmlns:a14="http://schemas.microsoft.com/office/drawing/2010/main" val="0"/>
-              </a:ext>
-            </a:extLst>
-          </a:blip>
-          <a:stretch>
-            <a:fillRect/>
-          </a:stretch>
-        </p:blipFill>
-        <p:spPr>
-          <a:xfrm>
-            <a:off x="0" y="4123057"/>
-            <a:ext cx="12192000" cy="1763305"/>
-          </a:xfrm>
-          <a:prstGeom prst="rect">
-            <a:avLst/>
-          </a:prstGeom>
-        </p:spPr>
-      </p:pic>
-      <p:pic>
-        <p:nvPicPr>
-          <p:cNvPr id="16" name="Picture 15"/>
-          <p:cNvPicPr>
-            <a:picLocks noChangeAspect="1"/>
-          </p:cNvPicPr>
-          <p:nvPr/>
-        </p:nvPicPr>
-        <p:blipFill>
-          <a:blip r:embed="rId5">
-            <a:extLst>
-              <a:ext uri="{28A0092B-C50C-407E-A947-70E740481C1C}">
-                <a14:useLocalDpi xmlns:a14="http://schemas.microsoft.com/office/drawing/2010/main" val="0"/>
-              </a:ext>
-            </a:extLst>
-          </a:blip>
-          <a:stretch>
-            <a:fillRect/>
-          </a:stretch>
-        </p:blipFill>
-        <p:spPr>
-          <a:xfrm>
-            <a:off x="399738" y="3074687"/>
-            <a:ext cx="2501900" cy="787400"/>
-          </a:xfrm>
-          <a:prstGeom prst="rect">
-            <a:avLst/>
-          </a:prstGeom>
-        </p:spPr>
-      </p:pic>
+      <p:sp>
+        <p:nvSpPr>
+          <p:cNvPr id="4" name="TextBox 3"/>
+          <p:cNvSpPr txBox="1"/>
+          <p:nvPr/>
+        </p:nvSpPr>
+        <p:spPr>
+          <a:xfrm>
+            <a:off x="1759788" y="1856172"/>
+            <a:ext cx="1531168" cy="369332"/>
+          </a:xfrm>
+          <a:prstGeom prst="rect">
+            <a:avLst/>
+          </a:prstGeom>
+          <a:noFill/>
+        </p:spPr>
+        <p:txBody>
+          <a:bodyPr wrap="square" rtlCol="0">
+            <a:spAutoFit/>
+          </a:bodyPr>
+          <a:lstStyle/>
+          <a:p>
+            <a:r>
+              <a:rPr lang="en-US" dirty="0" smtClean="0"/>
+              <a:t>Crop </a:t>
+            </a:r>
+            <a:r>
+              <a:rPr lang="en-US" smtClean="0"/>
+              <a:t>by suffix</a:t>
+            </a:r>
+            <a:endParaRPr lang="en-US" dirty="0"/>
+          </a:p>
+        </p:txBody>
+      </p:sp>
+      <p:sp>
+        <p:nvSpPr>
+          <p:cNvPr id="17" name="TextBox 16"/>
+          <p:cNvSpPr txBox="1"/>
+          <p:nvPr/>
+        </p:nvSpPr>
+        <p:spPr>
+          <a:xfrm>
+            <a:off x="4790538" y="1899281"/>
+            <a:ext cx="1831676" cy="369332"/>
+          </a:xfrm>
+          <a:prstGeom prst="rect">
+            <a:avLst/>
+          </a:prstGeom>
+          <a:noFill/>
+        </p:spPr>
+        <p:txBody>
+          <a:bodyPr wrap="square" rtlCol="0">
+            <a:spAutoFit/>
+          </a:bodyPr>
+          <a:lstStyle/>
+          <a:p>
+            <a:r>
+              <a:rPr lang="en-US" smtClean="0"/>
+              <a:t>One-hot encode</a:t>
+            </a:r>
+            <a:endParaRPr lang="en-US" dirty="0"/>
+          </a:p>
+        </p:txBody>
+      </p:sp>
+      <p:sp>
+        <p:nvSpPr>
+          <p:cNvPr id="6" name="Rounded Rectangle 5"/>
+          <p:cNvSpPr/>
+          <p:nvPr/>
+        </p:nvSpPr>
+        <p:spPr>
+          <a:xfrm>
+            <a:off x="166777" y="1992161"/>
+            <a:ext cx="1593011" cy="680851"/>
+          </a:xfrm>
+          <a:prstGeom prst="roundRect">
+            <a:avLst/>
+          </a:prstGeom>
+        </p:spPr>
+        <p:style>
+          <a:lnRef idx="1">
+            <a:schemeClr val="accent1"/>
+          </a:lnRef>
+          <a:fillRef idx="2">
+            <a:schemeClr val="accent1"/>
+          </a:fillRef>
+          <a:effectRef idx="1">
+            <a:schemeClr val="accent1"/>
+          </a:effectRef>
+          <a:fontRef idx="minor">
+            <a:schemeClr val="dk1"/>
+          </a:fontRef>
+        </p:style>
+        <p:txBody>
+          <a:bodyPr rtlCol="0" anchor="ctr"/>
+          <a:lstStyle/>
+          <a:p>
+            <a:pPr algn="ctr"/>
+            <a:r>
+              <a:rPr lang="en-US" dirty="0" smtClean="0"/>
+              <a:t>Raw test data</a:t>
+            </a:r>
+            <a:endParaRPr lang="en-US" dirty="0"/>
+          </a:p>
+        </p:txBody>
+      </p:sp>
+      <p:sp>
+        <p:nvSpPr>
+          <p:cNvPr id="19" name="Rounded Rectangle 18"/>
+          <p:cNvSpPr/>
+          <p:nvPr/>
+        </p:nvSpPr>
+        <p:spPr>
+          <a:xfrm>
+            <a:off x="3164481" y="1992161"/>
+            <a:ext cx="1593011" cy="680851"/>
+          </a:xfrm>
+          <a:prstGeom prst="roundRect">
+            <a:avLst/>
+          </a:prstGeom>
+        </p:spPr>
+        <p:style>
+          <a:lnRef idx="1">
+            <a:schemeClr val="accent1"/>
+          </a:lnRef>
+          <a:fillRef idx="2">
+            <a:schemeClr val="accent1"/>
+          </a:fillRef>
+          <a:effectRef idx="1">
+            <a:schemeClr val="accent1"/>
+          </a:effectRef>
+          <a:fontRef idx="minor">
+            <a:schemeClr val="dk1"/>
+          </a:fontRef>
+        </p:style>
+        <p:txBody>
+          <a:bodyPr rtlCol="0" anchor="ctr"/>
+          <a:lstStyle/>
+          <a:p>
+            <a:pPr algn="ctr"/>
+            <a:r>
+              <a:rPr lang="en-US" smtClean="0"/>
+              <a:t>Input X</a:t>
+            </a:r>
+            <a:endParaRPr lang="en-US" dirty="0"/>
+          </a:p>
+        </p:txBody>
+      </p:sp>
+      <p:sp>
+        <p:nvSpPr>
+          <p:cNvPr id="20" name="Rounded Rectangle 19"/>
+          <p:cNvSpPr/>
+          <p:nvPr/>
+        </p:nvSpPr>
+        <p:spPr>
+          <a:xfrm>
+            <a:off x="6461185" y="1992161"/>
+            <a:ext cx="1593011" cy="680851"/>
+          </a:xfrm>
+          <a:prstGeom prst="roundRect">
+            <a:avLst/>
+          </a:prstGeom>
+        </p:spPr>
+        <p:style>
+          <a:lnRef idx="1">
+            <a:schemeClr val="accent1"/>
+          </a:lnRef>
+          <a:fillRef idx="2">
+            <a:schemeClr val="accent1"/>
+          </a:fillRef>
+          <a:effectRef idx="1">
+            <a:schemeClr val="accent1"/>
+          </a:effectRef>
+          <a:fontRef idx="minor">
+            <a:schemeClr val="dk1"/>
+          </a:fontRef>
+        </p:style>
+        <p:txBody>
+          <a:bodyPr rtlCol="0" anchor="ctr"/>
+          <a:lstStyle/>
+          <a:p>
+            <a:pPr algn="ctr"/>
+            <a:r>
+              <a:rPr lang="en-US" smtClean="0"/>
+              <a:t>Encoded input X</a:t>
+            </a:r>
+            <a:endParaRPr lang="en-US" dirty="0"/>
+          </a:p>
+        </p:txBody>
+      </p:sp>
+      <p:sp>
+        <p:nvSpPr>
+          <p:cNvPr id="21" name="Rounded Rectangle 20"/>
+          <p:cNvSpPr/>
+          <p:nvPr/>
+        </p:nvSpPr>
+        <p:spPr>
+          <a:xfrm>
+            <a:off x="3164480" y="3439252"/>
+            <a:ext cx="1593011" cy="680851"/>
+          </a:xfrm>
+          <a:prstGeom prst="roundRect">
+            <a:avLst/>
+          </a:prstGeom>
+        </p:spPr>
+        <p:style>
+          <a:lnRef idx="1">
+            <a:schemeClr val="accent1"/>
+          </a:lnRef>
+          <a:fillRef idx="2">
+            <a:schemeClr val="accent1"/>
+          </a:fillRef>
+          <a:effectRef idx="1">
+            <a:schemeClr val="accent1"/>
+          </a:effectRef>
+          <a:fontRef idx="minor">
+            <a:schemeClr val="dk1"/>
+          </a:fontRef>
+        </p:style>
+        <p:txBody>
+          <a:bodyPr rtlCol="0" anchor="ctr"/>
+          <a:lstStyle/>
+          <a:p>
+            <a:pPr algn="ctr"/>
+            <a:r>
+              <a:rPr lang="en-US" dirty="0" smtClean="0"/>
+              <a:t>Ground truth Y</a:t>
+            </a:r>
+            <a:endParaRPr lang="en-US" dirty="0"/>
+          </a:p>
+        </p:txBody>
+      </p:sp>
+      <p:sp>
+        <p:nvSpPr>
+          <p:cNvPr id="22" name="Rounded Rectangle 21"/>
+          <p:cNvSpPr/>
+          <p:nvPr/>
+        </p:nvSpPr>
+        <p:spPr>
+          <a:xfrm>
+            <a:off x="9724843" y="1992161"/>
+            <a:ext cx="1593011" cy="680851"/>
+          </a:xfrm>
+          <a:prstGeom prst="roundRect">
+            <a:avLst/>
+          </a:prstGeom>
+        </p:spPr>
+        <p:style>
+          <a:lnRef idx="1">
+            <a:schemeClr val="accent1"/>
+          </a:lnRef>
+          <a:fillRef idx="2">
+            <a:schemeClr val="accent1"/>
+          </a:fillRef>
+          <a:effectRef idx="1">
+            <a:schemeClr val="accent1"/>
+          </a:effectRef>
+          <a:fontRef idx="minor">
+            <a:schemeClr val="dk1"/>
+          </a:fontRef>
+        </p:style>
+        <p:txBody>
+          <a:bodyPr rtlCol="0" anchor="ctr"/>
+          <a:lstStyle/>
+          <a:p>
+            <a:pPr algn="ctr"/>
+            <a:r>
+              <a:rPr lang="en-US" dirty="0" smtClean="0"/>
+              <a:t>Encoded prediction Y</a:t>
+            </a:r>
+            <a:endParaRPr lang="en-US" dirty="0"/>
+          </a:p>
+        </p:txBody>
+      </p:sp>
+      <p:sp>
+        <p:nvSpPr>
+          <p:cNvPr id="23" name="Rounded Rectangle 22"/>
+          <p:cNvSpPr/>
+          <p:nvPr/>
+        </p:nvSpPr>
+        <p:spPr>
+          <a:xfrm>
+            <a:off x="7257690" y="3422337"/>
+            <a:ext cx="1593011" cy="680851"/>
+          </a:xfrm>
+          <a:prstGeom prst="roundRect">
+            <a:avLst/>
+          </a:prstGeom>
+        </p:spPr>
+        <p:style>
+          <a:lnRef idx="1">
+            <a:schemeClr val="accent1"/>
+          </a:lnRef>
+          <a:fillRef idx="2">
+            <a:schemeClr val="accent1"/>
+          </a:fillRef>
+          <a:effectRef idx="1">
+            <a:schemeClr val="accent1"/>
+          </a:effectRef>
+          <a:fontRef idx="minor">
+            <a:schemeClr val="dk1"/>
+          </a:fontRef>
+        </p:style>
+        <p:txBody>
+          <a:bodyPr rtlCol="0" anchor="ctr"/>
+          <a:lstStyle/>
+          <a:p>
+            <a:pPr algn="ctr"/>
+            <a:r>
+              <a:rPr lang="en-US" dirty="0" smtClean="0"/>
+              <a:t>Predicted Y</a:t>
+            </a:r>
+            <a:endParaRPr lang="en-US" dirty="0"/>
+          </a:p>
+        </p:txBody>
+      </p:sp>
       <p:cxnSp>
         <p:nvCxnSpPr>
-          <p:cNvPr id="31" name="Straight Arrow Connector 30"/>
-          <p:cNvCxnSpPr/>
+          <p:cNvPr id="10" name="Straight Arrow Connector 9"/>
+          <p:cNvCxnSpPr>
+            <a:stCxn id="6" idx="3"/>
+            <a:endCxn id="19" idx="1"/>
+          </p:cNvCxnSpPr>
           <p:nvPr/>
         </p:nvCxnSpPr>
         <p:spPr>
           <a:xfrm>
-            <a:off x="4865298" y="3312543"/>
-            <a:ext cx="1794294" cy="0"/>
+            <a:off x="1759788" y="2332587"/>
+            <a:ext cx="1404693" cy="0"/>
           </a:xfrm>
           <a:prstGeom prst="straightConnector1">
             <a:avLst/>
@@ -5576,92 +4109,19 @@
           </a:fontRef>
         </p:style>
       </p:cxnSp>
-      <p:sp>
-        <p:nvSpPr>
-          <p:cNvPr id="32" name="TextBox 31"/>
-          <p:cNvSpPr txBox="1"/>
-          <p:nvPr/>
-        </p:nvSpPr>
-        <p:spPr>
-          <a:xfrm>
-            <a:off x="6659592" y="3051573"/>
-            <a:ext cx="2346385" cy="923330"/>
-          </a:xfrm>
-          <a:prstGeom prst="rect">
-            <a:avLst/>
-          </a:prstGeom>
-          <a:noFill/>
-        </p:spPr>
-        <p:txBody>
-          <a:bodyPr wrap="square" rtlCol="0">
-            <a:spAutoFit/>
-          </a:bodyPr>
-          <a:lstStyle/>
-          <a:p>
-            <a:r>
-              <a:rPr lang="en-US" b="1" dirty="0"/>
-              <a:t>g</a:t>
-            </a:r>
-            <a:r>
-              <a:rPr lang="vi-VN" b="1" dirty="0" smtClean="0"/>
-              <a:t>round_truth: next activity after suffix activities </a:t>
-            </a:r>
-            <a:endParaRPr lang="en-US" b="1" dirty="0"/>
-          </a:p>
-        </p:txBody>
-      </p:sp>
-      <p:sp>
-        <p:nvSpPr>
-          <p:cNvPr id="33" name="TextBox 32"/>
-          <p:cNvSpPr txBox="1"/>
-          <p:nvPr/>
-        </p:nvSpPr>
-        <p:spPr>
-          <a:xfrm>
-            <a:off x="931653" y="5886362"/>
-            <a:ext cx="9092241" cy="369332"/>
-          </a:xfrm>
-          <a:prstGeom prst="rect">
-            <a:avLst/>
-          </a:prstGeom>
-          <a:noFill/>
-        </p:spPr>
-        <p:txBody>
-          <a:bodyPr wrap="square" rtlCol="0">
-            <a:spAutoFit/>
-          </a:bodyPr>
-          <a:lstStyle/>
-          <a:p>
-            <a:r>
-              <a:rPr lang="vi-VN" b="1" dirty="0" smtClean="0"/>
-              <a:t>ground_truth_t: </a:t>
-            </a:r>
-            <a:r>
-              <a:rPr lang="en-US" b="1" dirty="0" smtClean="0"/>
-              <a:t>610689 = 611523 </a:t>
-            </a:r>
-            <a:r>
-              <a:rPr lang="mr-IN" b="1" dirty="0" smtClean="0"/>
-              <a:t>–</a:t>
-            </a:r>
-            <a:r>
-              <a:rPr lang="en-US" b="1" dirty="0" smtClean="0"/>
-              <a:t> 834: remaining time after suffix activities</a:t>
-            </a:r>
-            <a:endParaRPr lang="en-US" b="1" dirty="0"/>
-          </a:p>
-        </p:txBody>
-      </p:sp>
       <p:cxnSp>
         <p:nvCxnSpPr>
-          <p:cNvPr id="35" name="Straight Arrow Connector 34"/>
-          <p:cNvCxnSpPr/>
+          <p:cNvPr id="12" name="Straight Arrow Connector 11"/>
+          <p:cNvCxnSpPr>
+            <a:stCxn id="6" idx="3"/>
+            <a:endCxn id="21" idx="1"/>
+          </p:cNvCxnSpPr>
           <p:nvPr/>
         </p:nvCxnSpPr>
         <p:spPr>
-          <a:xfrm flipV="1">
-            <a:off x="2398143" y="1311215"/>
-            <a:ext cx="6400800" cy="17253"/>
+          <a:xfrm>
+            <a:off x="1759788" y="2332587"/>
+            <a:ext cx="1404692" cy="1447091"/>
           </a:xfrm>
           <a:prstGeom prst="straightConnector1">
             <a:avLst/>
@@ -5685,16 +4145,124 @@
           </a:fontRef>
         </p:style>
       </p:cxnSp>
-      <p:sp>
-        <p:nvSpPr>
-          <p:cNvPr id="36" name="TextBox 35"/>
+      <p:cxnSp>
+        <p:nvCxnSpPr>
+          <p:cNvPr id="14" name="Straight Arrow Connector 13"/>
+          <p:cNvCxnSpPr>
+            <a:stCxn id="19" idx="3"/>
+            <a:endCxn id="20" idx="1"/>
+          </p:cNvCxnSpPr>
+          <p:nvPr/>
+        </p:nvCxnSpPr>
+        <p:spPr>
+          <a:xfrm>
+            <a:off x="4757492" y="2332587"/>
+            <a:ext cx="1703693" cy="0"/>
+          </a:xfrm>
+          <a:prstGeom prst="straightConnector1">
+            <a:avLst/>
+          </a:prstGeom>
+          <a:ln>
+            <a:tailEnd type="triangle"/>
+          </a:ln>
+        </p:spPr>
+        <p:style>
+          <a:lnRef idx="1">
+            <a:schemeClr val="accent1"/>
+          </a:lnRef>
+          <a:fillRef idx="0">
+            <a:schemeClr val="accent1"/>
+          </a:fillRef>
+          <a:effectRef idx="0">
+            <a:schemeClr val="accent1"/>
+          </a:effectRef>
+          <a:fontRef idx="minor">
+            <a:schemeClr val="tx1"/>
+          </a:fontRef>
+        </p:style>
+      </p:cxnSp>
+      <p:cxnSp>
+        <p:nvCxnSpPr>
+          <p:cNvPr id="24" name="Straight Arrow Connector 23"/>
+          <p:cNvCxnSpPr>
+            <a:stCxn id="20" idx="3"/>
+            <a:endCxn id="22" idx="1"/>
+          </p:cNvCxnSpPr>
+          <p:nvPr/>
+        </p:nvCxnSpPr>
+        <p:spPr>
+          <a:xfrm>
+            <a:off x="8054196" y="2332587"/>
+            <a:ext cx="1670647" cy="0"/>
+          </a:xfrm>
+          <a:prstGeom prst="straightConnector1">
+            <a:avLst/>
+          </a:prstGeom>
+          <a:ln>
+            <a:tailEnd type="triangle"/>
+          </a:ln>
+        </p:spPr>
+        <p:style>
+          <a:lnRef idx="1">
+            <a:schemeClr val="accent1"/>
+          </a:lnRef>
+          <a:fillRef idx="0">
+            <a:schemeClr val="accent1"/>
+          </a:fillRef>
+          <a:effectRef idx="0">
+            <a:schemeClr val="accent1"/>
+          </a:effectRef>
+          <a:fontRef idx="minor">
+            <a:schemeClr val="tx1"/>
+          </a:fontRef>
+        </p:style>
+      </p:cxnSp>
+      <p:cxnSp>
+        <p:nvCxnSpPr>
+          <p:cNvPr id="28" name="Elbow Connector 27"/>
+          <p:cNvCxnSpPr>
+            <a:stCxn id="22" idx="2"/>
+            <a:endCxn id="23" idx="3"/>
+          </p:cNvCxnSpPr>
+          <p:nvPr/>
+        </p:nvCxnSpPr>
+        <p:spPr>
+          <a:xfrm rot="5400000">
+            <a:off x="9141150" y="2382563"/>
+            <a:ext cx="1089751" cy="1670648"/>
+          </a:xfrm>
+          <a:prstGeom prst="bentConnector2">
+            <a:avLst/>
+          </a:prstGeom>
+          <a:ln>
+            <a:tailEnd type="triangle"/>
+          </a:ln>
+        </p:spPr>
+        <p:style>
+          <a:lnRef idx="1">
+            <a:schemeClr val="accent1"/>
+          </a:lnRef>
+          <a:fillRef idx="0">
+            <a:schemeClr val="accent1"/>
+          </a:fillRef>
+          <a:effectRef idx="0">
+            <a:schemeClr val="accent1"/>
+          </a:effectRef>
+          <a:fontRef idx="minor">
+            <a:schemeClr val="tx1"/>
+          </a:fontRef>
+        </p:style>
+      </p:cxnSp>
+      <p:sp>
+        <p:nvSpPr>
+          <p:cNvPr id="39" name="TextBox 38"/>
           <p:cNvSpPr txBox="1"/>
           <p:nvPr/>
         </p:nvSpPr>
         <p:spPr>
           <a:xfrm>
-            <a:off x="8753654" y="988049"/>
-            <a:ext cx="2898476" cy="646331"/>
+            <a:off x="2901396" y="5467918"/>
+            <a:ext cx="1831676" cy="369332"/>
           </a:xfrm>
           <a:prstGeom prst="rect">
             <a:avLst/>
@@ -5708,85 +4276,501 @@
           <a:lstStyle/>
           <a:p>
             <a:r>
+              <a:rPr lang="en-US" smtClean="0"/>
+              <a:t>Evaluation</a:t>
+            </a:r>
+            <a:endParaRPr lang="en-US" dirty="0"/>
+          </a:p>
+        </p:txBody>
+      </p:sp>
+      <p:sp>
+        <p:nvSpPr>
+          <p:cNvPr id="40" name="TextBox 39"/>
+          <p:cNvSpPr txBox="1"/>
+          <p:nvPr/>
+        </p:nvSpPr>
+        <p:spPr>
+          <a:xfrm>
+            <a:off x="8925437" y="3714072"/>
+            <a:ext cx="2976137" cy="646331"/>
+          </a:xfrm>
+          <a:prstGeom prst="rect">
+            <a:avLst/>
+          </a:prstGeom>
+          <a:noFill/>
+        </p:spPr>
+        <p:txBody>
+          <a:bodyPr wrap="square" rtlCol="0">
+            <a:spAutoFit/>
+          </a:bodyPr>
+          <a:lstStyle/>
+          <a:p>
+            <a:r>
               <a:rPr lang="en-US" dirty="0" smtClean="0"/>
-              <a:t>To deal with short case when suffix&gt;</a:t>
-            </a:r>
-            <a:r>
-              <a:rPr lang="en-US" dirty="0" err="1" smtClean="0"/>
-              <a:t>len</a:t>
-            </a:r>
+              <a:t>Inverse transform label</a:t>
+            </a:r>
+          </a:p>
+          <a:p>
             <a:r>
               <a:rPr lang="en-US" dirty="0" smtClean="0"/>
-              <a:t>(case)</a:t>
+              <a:t>(inverse-encode/normalize)</a:t>
             </a:r>
             <a:endParaRPr lang="en-US" dirty="0"/>
           </a:p>
         </p:txBody>
       </p:sp>
-      <p:pic>
-        <p:nvPicPr>
-          <p:cNvPr id="37" name="Picture 36"/>
-          <p:cNvPicPr>
-            <a:picLocks noChangeAspect="1"/>
-          </p:cNvPicPr>
-          <p:nvPr/>
-        </p:nvPicPr>
-        <p:blipFill>
-          <a:blip r:embed="rId6">
-            <a:extLst>
-              <a:ext uri="{28A0092B-C50C-407E-A947-70E740481C1C}">
-                <a14:useLocalDpi xmlns:a14="http://schemas.microsoft.com/office/drawing/2010/main" val="0"/>
-              </a:ext>
-            </a:extLst>
-          </a:blip>
-          <a:stretch>
-            <a:fillRect/>
-          </a:stretch>
-        </p:blipFill>
-        <p:spPr>
-          <a:xfrm>
-            <a:off x="8238169" y="1569721"/>
-            <a:ext cx="3953831" cy="595200"/>
-          </a:xfrm>
-          <a:prstGeom prst="rect">
-            <a:avLst/>
-          </a:prstGeom>
-        </p:spPr>
-      </p:pic>
-      <p:pic>
-        <p:nvPicPr>
-          <p:cNvPr id="38" name="Picture 37"/>
-          <p:cNvPicPr>
-            <a:picLocks noChangeAspect="1"/>
-          </p:cNvPicPr>
-          <p:nvPr/>
-        </p:nvPicPr>
-        <p:blipFill>
-          <a:blip r:embed="rId7">
-            <a:extLst>
-              <a:ext uri="{28A0092B-C50C-407E-A947-70E740481C1C}">
-                <a14:useLocalDpi xmlns:a14="http://schemas.microsoft.com/office/drawing/2010/main" val="0"/>
-              </a:ext>
-            </a:extLst>
-          </a:blip>
-          <a:stretch>
-            <a:fillRect/>
-          </a:stretch>
-        </p:blipFill>
-        <p:spPr>
-          <a:xfrm>
-            <a:off x="8204487" y="2198028"/>
-            <a:ext cx="2269022" cy="528238"/>
-          </a:xfrm>
-          <a:prstGeom prst="rect">
-            <a:avLst/>
-          </a:prstGeom>
-        </p:spPr>
-      </p:pic>
+      <p:sp>
+        <p:nvSpPr>
+          <p:cNvPr id="41" name="Rounded Rectangle 40"/>
+          <p:cNvSpPr/>
+          <p:nvPr/>
+        </p:nvSpPr>
+        <p:spPr>
+          <a:xfrm>
+            <a:off x="1788566" y="4545918"/>
+            <a:ext cx="1593011" cy="680851"/>
+          </a:xfrm>
+          <a:prstGeom prst="roundRect">
+            <a:avLst/>
+          </a:prstGeom>
+        </p:spPr>
+        <p:style>
+          <a:lnRef idx="1">
+            <a:schemeClr val="accent1"/>
+          </a:lnRef>
+          <a:fillRef idx="2">
+            <a:schemeClr val="accent1"/>
+          </a:fillRef>
+          <a:effectRef idx="1">
+            <a:schemeClr val="accent1"/>
+          </a:effectRef>
+          <a:fontRef idx="minor">
+            <a:schemeClr val="dk1"/>
+          </a:fontRef>
+        </p:style>
+        <p:txBody>
+          <a:bodyPr rtlCol="0" anchor="ctr"/>
+          <a:lstStyle/>
+          <a:p>
+            <a:pPr algn="ctr"/>
+            <a:r>
+              <a:rPr lang="en-US" dirty="0" smtClean="0"/>
+              <a:t>Ground truth activity</a:t>
+            </a:r>
+            <a:endParaRPr lang="en-US" dirty="0"/>
+          </a:p>
+        </p:txBody>
+      </p:sp>
+      <p:sp>
+        <p:nvSpPr>
+          <p:cNvPr id="42" name="Rounded Rectangle 41"/>
+          <p:cNvSpPr/>
+          <p:nvPr/>
+        </p:nvSpPr>
+        <p:spPr>
+          <a:xfrm>
+            <a:off x="4339110" y="4545918"/>
+            <a:ext cx="1593011" cy="680851"/>
+          </a:xfrm>
+          <a:prstGeom prst="roundRect">
+            <a:avLst/>
+          </a:prstGeom>
+        </p:spPr>
+        <p:style>
+          <a:lnRef idx="1">
+            <a:schemeClr val="accent1"/>
+          </a:lnRef>
+          <a:fillRef idx="2">
+            <a:schemeClr val="accent1"/>
+          </a:fillRef>
+          <a:effectRef idx="1">
+            <a:schemeClr val="accent1"/>
+          </a:effectRef>
+          <a:fontRef idx="minor">
+            <a:schemeClr val="dk1"/>
+          </a:fontRef>
+        </p:style>
+        <p:txBody>
+          <a:bodyPr rtlCol="0" anchor="ctr"/>
+          <a:lstStyle/>
+          <a:p>
+            <a:pPr algn="ctr"/>
+            <a:r>
+              <a:rPr lang="en-US" dirty="0" smtClean="0"/>
+              <a:t>Ground truth time</a:t>
+            </a:r>
+            <a:endParaRPr lang="en-US" dirty="0"/>
+          </a:p>
+        </p:txBody>
+      </p:sp>
+      <p:sp>
+        <p:nvSpPr>
+          <p:cNvPr id="43" name="Rounded Rectangle 42"/>
+          <p:cNvSpPr/>
+          <p:nvPr/>
+        </p:nvSpPr>
+        <p:spPr>
+          <a:xfrm>
+            <a:off x="6215355" y="4545918"/>
+            <a:ext cx="1593011" cy="680851"/>
+          </a:xfrm>
+          <a:prstGeom prst="roundRect">
+            <a:avLst/>
+          </a:prstGeom>
+        </p:spPr>
+        <p:style>
+          <a:lnRef idx="1">
+            <a:schemeClr val="accent1"/>
+          </a:lnRef>
+          <a:fillRef idx="2">
+            <a:schemeClr val="accent1"/>
+          </a:fillRef>
+          <a:effectRef idx="1">
+            <a:schemeClr val="accent1"/>
+          </a:effectRef>
+          <a:fontRef idx="minor">
+            <a:schemeClr val="dk1"/>
+          </a:fontRef>
+        </p:style>
+        <p:txBody>
+          <a:bodyPr rtlCol="0" anchor="ctr"/>
+          <a:lstStyle/>
+          <a:p>
+            <a:pPr algn="ctr"/>
+            <a:r>
+              <a:rPr lang="en-US" dirty="0" smtClean="0"/>
+              <a:t>Predicted activity</a:t>
+            </a:r>
+            <a:endParaRPr lang="en-US" dirty="0"/>
+          </a:p>
+        </p:txBody>
+      </p:sp>
+      <p:sp>
+        <p:nvSpPr>
+          <p:cNvPr id="44" name="Rounded Rectangle 43"/>
+          <p:cNvSpPr/>
+          <p:nvPr/>
+        </p:nvSpPr>
+        <p:spPr>
+          <a:xfrm>
+            <a:off x="8588316" y="4545918"/>
+            <a:ext cx="1593011" cy="680851"/>
+          </a:xfrm>
+          <a:prstGeom prst="roundRect">
+            <a:avLst/>
+          </a:prstGeom>
+        </p:spPr>
+        <p:style>
+          <a:lnRef idx="1">
+            <a:schemeClr val="accent1"/>
+          </a:lnRef>
+          <a:fillRef idx="2">
+            <a:schemeClr val="accent1"/>
+          </a:fillRef>
+          <a:effectRef idx="1">
+            <a:schemeClr val="accent1"/>
+          </a:effectRef>
+          <a:fontRef idx="minor">
+            <a:schemeClr val="dk1"/>
+          </a:fontRef>
+        </p:style>
+        <p:txBody>
+          <a:bodyPr rtlCol="0" anchor="ctr"/>
+          <a:lstStyle/>
+          <a:p>
+            <a:pPr algn="ctr"/>
+            <a:r>
+              <a:rPr lang="en-US" dirty="0" smtClean="0"/>
+              <a:t>Predicted time</a:t>
+            </a:r>
+            <a:endParaRPr lang="en-US" dirty="0"/>
+          </a:p>
+        </p:txBody>
+      </p:sp>
+      <p:cxnSp>
+        <p:nvCxnSpPr>
+          <p:cNvPr id="34" name="Straight Arrow Connector 33"/>
+          <p:cNvCxnSpPr>
+            <a:stCxn id="21" idx="2"/>
+            <a:endCxn id="41" idx="0"/>
+          </p:cNvCxnSpPr>
+          <p:nvPr/>
+        </p:nvCxnSpPr>
+        <p:spPr>
+          <a:xfrm flipH="1">
+            <a:off x="2585072" y="4120103"/>
+            <a:ext cx="1375914" cy="425815"/>
+          </a:xfrm>
+          <a:prstGeom prst="straightConnector1">
+            <a:avLst/>
+          </a:prstGeom>
+          <a:ln>
+            <a:tailEnd type="triangle"/>
+          </a:ln>
+        </p:spPr>
+        <p:style>
+          <a:lnRef idx="1">
+            <a:schemeClr val="accent1"/>
+          </a:lnRef>
+          <a:fillRef idx="0">
+            <a:schemeClr val="accent1"/>
+          </a:fillRef>
+          <a:effectRef idx="0">
+            <a:schemeClr val="accent1"/>
+          </a:effectRef>
+          <a:fontRef idx="minor">
+            <a:schemeClr val="tx1"/>
+          </a:fontRef>
+        </p:style>
+      </p:cxnSp>
+      <p:cxnSp>
+        <p:nvCxnSpPr>
+          <p:cNvPr id="46" name="Straight Arrow Connector 45"/>
+          <p:cNvCxnSpPr>
+            <a:stCxn id="21" idx="2"/>
+            <a:endCxn id="42" idx="0"/>
+          </p:cNvCxnSpPr>
+          <p:nvPr/>
+        </p:nvCxnSpPr>
+        <p:spPr>
+          <a:xfrm>
+            <a:off x="3960986" y="4120103"/>
+            <a:ext cx="1174630" cy="425815"/>
+          </a:xfrm>
+          <a:prstGeom prst="straightConnector1">
+            <a:avLst/>
+          </a:prstGeom>
+          <a:ln>
+            <a:tailEnd type="triangle"/>
+          </a:ln>
+        </p:spPr>
+        <p:style>
+          <a:lnRef idx="1">
+            <a:schemeClr val="accent1"/>
+          </a:lnRef>
+          <a:fillRef idx="0">
+            <a:schemeClr val="accent1"/>
+          </a:fillRef>
+          <a:effectRef idx="0">
+            <a:schemeClr val="accent1"/>
+          </a:effectRef>
+          <a:fontRef idx="minor">
+            <a:schemeClr val="tx1"/>
+          </a:fontRef>
+        </p:style>
+      </p:cxnSp>
+      <p:cxnSp>
+        <p:nvCxnSpPr>
+          <p:cNvPr id="48" name="Straight Arrow Connector 47"/>
+          <p:cNvCxnSpPr>
+            <a:stCxn id="23" idx="2"/>
+            <a:endCxn id="43" idx="0"/>
+          </p:cNvCxnSpPr>
+          <p:nvPr/>
+        </p:nvCxnSpPr>
+        <p:spPr>
+          <a:xfrm flipH="1">
+            <a:off x="7011861" y="4103188"/>
+            <a:ext cx="1042335" cy="442730"/>
+          </a:xfrm>
+          <a:prstGeom prst="straightConnector1">
+            <a:avLst/>
+          </a:prstGeom>
+          <a:ln>
+            <a:tailEnd type="triangle"/>
+          </a:ln>
+        </p:spPr>
+        <p:style>
+          <a:lnRef idx="1">
+            <a:schemeClr val="accent1"/>
+          </a:lnRef>
+          <a:fillRef idx="0">
+            <a:schemeClr val="accent1"/>
+          </a:fillRef>
+          <a:effectRef idx="0">
+            <a:schemeClr val="accent1"/>
+          </a:effectRef>
+          <a:fontRef idx="minor">
+            <a:schemeClr val="tx1"/>
+          </a:fontRef>
+        </p:style>
+      </p:cxnSp>
+      <p:cxnSp>
+        <p:nvCxnSpPr>
+          <p:cNvPr id="50" name="Straight Arrow Connector 49"/>
+          <p:cNvCxnSpPr>
+            <a:stCxn id="23" idx="2"/>
+            <a:endCxn id="44" idx="0"/>
+          </p:cNvCxnSpPr>
+          <p:nvPr/>
+        </p:nvCxnSpPr>
+        <p:spPr>
+          <a:xfrm>
+            <a:off x="8054196" y="4103188"/>
+            <a:ext cx="1330626" cy="442730"/>
+          </a:xfrm>
+          <a:prstGeom prst="straightConnector1">
+            <a:avLst/>
+          </a:prstGeom>
+          <a:ln>
+            <a:tailEnd type="triangle"/>
+          </a:ln>
+        </p:spPr>
+        <p:style>
+          <a:lnRef idx="1">
+            <a:schemeClr val="accent1"/>
+          </a:lnRef>
+          <a:fillRef idx="0">
+            <a:schemeClr val="accent1"/>
+          </a:fillRef>
+          <a:effectRef idx="0">
+            <a:schemeClr val="accent1"/>
+          </a:effectRef>
+          <a:fontRef idx="minor">
+            <a:schemeClr val="tx1"/>
+          </a:fontRef>
+        </p:style>
+      </p:cxnSp>
+      <p:cxnSp>
+        <p:nvCxnSpPr>
+          <p:cNvPr id="54" name="Elbow Connector 53"/>
+          <p:cNvCxnSpPr>
+            <a:stCxn id="41" idx="2"/>
+            <a:endCxn id="43" idx="2"/>
+          </p:cNvCxnSpPr>
+          <p:nvPr/>
+        </p:nvCxnSpPr>
+        <p:spPr>
+          <a:xfrm rot="16200000" flipH="1">
+            <a:off x="4798466" y="3013374"/>
+            <a:ext cx="12700" cy="4426789"/>
+          </a:xfrm>
+          <a:prstGeom prst="bentConnector3">
+            <a:avLst>
+              <a:gd name="adj1" fmla="val 1800000"/>
+            </a:avLst>
+          </a:prstGeom>
+          <a:ln>
+            <a:prstDash val="dash"/>
+          </a:ln>
+        </p:spPr>
+        <p:style>
+          <a:lnRef idx="2">
+            <a:schemeClr val="accent2"/>
+          </a:lnRef>
+          <a:fillRef idx="0">
+            <a:schemeClr val="accent2"/>
+          </a:fillRef>
+          <a:effectRef idx="1">
+            <a:schemeClr val="accent2"/>
+          </a:effectRef>
+          <a:fontRef idx="minor">
+            <a:schemeClr val="tx1"/>
+          </a:fontRef>
+        </p:style>
+      </p:cxnSp>
+      <p:cxnSp>
+        <p:nvCxnSpPr>
+          <p:cNvPr id="58" name="Elbow Connector 57"/>
+          <p:cNvCxnSpPr>
+            <a:stCxn id="42" idx="2"/>
+            <a:endCxn id="44" idx="2"/>
+          </p:cNvCxnSpPr>
+          <p:nvPr/>
+        </p:nvCxnSpPr>
+        <p:spPr>
+          <a:xfrm rot="16200000" flipH="1">
+            <a:off x="7260219" y="3102166"/>
+            <a:ext cx="12700" cy="4249206"/>
+          </a:xfrm>
+          <a:prstGeom prst="bentConnector3">
+            <a:avLst>
+              <a:gd name="adj1" fmla="val 3022638"/>
+            </a:avLst>
+          </a:prstGeom>
+          <a:ln>
+            <a:prstDash val="dash"/>
+          </a:ln>
+        </p:spPr>
+        <p:style>
+          <a:lnRef idx="2">
+            <a:schemeClr val="accent2"/>
+          </a:lnRef>
+          <a:fillRef idx="0">
+            <a:schemeClr val="accent2"/>
+          </a:fillRef>
+          <a:effectRef idx="1">
+            <a:schemeClr val="accent2"/>
+          </a:effectRef>
+          <a:fontRef idx="minor">
+            <a:schemeClr val="tx1"/>
+          </a:fontRef>
+        </p:style>
+      </p:cxnSp>
+      <p:sp>
+        <p:nvSpPr>
+          <p:cNvPr id="63" name="TextBox 62"/>
+          <p:cNvSpPr txBox="1"/>
+          <p:nvPr/>
+        </p:nvSpPr>
+        <p:spPr>
+          <a:xfrm>
+            <a:off x="8206596" y="2008572"/>
+            <a:ext cx="1831676" cy="369332"/>
+          </a:xfrm>
+          <a:prstGeom prst="rect">
+            <a:avLst/>
+          </a:prstGeom>
+          <a:noFill/>
+        </p:spPr>
+        <p:txBody>
+          <a:bodyPr wrap="square" rtlCol="0">
+            <a:spAutoFit/>
+          </a:bodyPr>
+          <a:lstStyle/>
+          <a:p>
+            <a:r>
+              <a:rPr lang="en-US" dirty="0" smtClean="0"/>
+              <a:t>Predict model</a:t>
+            </a:r>
+            <a:endParaRPr lang="en-US" dirty="0"/>
+          </a:p>
+        </p:txBody>
+      </p:sp>
+      <p:sp>
+        <p:nvSpPr>
+          <p:cNvPr id="64" name="TextBox 63"/>
+          <p:cNvSpPr txBox="1"/>
+          <p:nvPr/>
+        </p:nvSpPr>
+        <p:spPr>
+          <a:xfrm>
+            <a:off x="7808366" y="5635669"/>
+            <a:ext cx="1831676" cy="369332"/>
+          </a:xfrm>
+          <a:prstGeom prst="rect">
+            <a:avLst/>
+          </a:prstGeom>
+          <a:noFill/>
+        </p:spPr>
+        <p:txBody>
+          <a:bodyPr wrap="square" rtlCol="0">
+            <a:spAutoFit/>
+          </a:bodyPr>
+          <a:lstStyle/>
+          <a:p>
+            <a:r>
+              <a:rPr lang="en-US" smtClean="0"/>
+              <a:t>Evaluation</a:t>
+            </a:r>
+            <a:endParaRPr lang="en-US" dirty="0"/>
+          </a:p>
+        </p:txBody>
+      </p:sp>
     </p:spTree>
     <p:extLst>
       <p:ext uri="{BB962C8B-B14F-4D97-AF65-F5344CB8AC3E}">
-        <p14:creationId xmlns:p14="http://schemas.microsoft.com/office/powerpoint/2010/main" val="402446683"/>
+        <p14:creationId xmlns:p14="http://schemas.microsoft.com/office/powerpoint/2010/main" val="1975174707"/>
       </p:ext>
     </p:extLst>
   </p:cSld>
@@ -5826,6 +4810,1326 @@
         <p:spPr>
           <a:xfrm>
             <a:off x="399738" y="162993"/>
+            <a:ext cx="9448799" cy="586515"/>
+          </a:xfrm>
+        </p:spPr>
+        <p:txBody>
+          <a:bodyPr>
+            <a:normAutofit fontScale="90000"/>
+          </a:bodyPr>
+          <a:lstStyle/>
+          <a:p>
+            <a:pPr algn="l"/>
+            <a:r>
+              <a:rPr lang="en-US" sz="4000" b="1" dirty="0" err="1"/>
+              <a:t>evaluate_next_activity_and_time</a:t>
+            </a:r>
+            <a:endParaRPr lang="en-US" sz="4000" b="1" dirty="0"/>
+          </a:p>
+        </p:txBody>
+      </p:sp>
+      <p:pic>
+        <p:nvPicPr>
+          <p:cNvPr id="3" name="Picture 2"/>
+          <p:cNvPicPr>
+            <a:picLocks noChangeAspect="1"/>
+          </p:cNvPicPr>
+          <p:nvPr/>
+        </p:nvPicPr>
+        <p:blipFill>
+          <a:blip r:embed="rId2">
+            <a:extLst>
+              <a:ext uri="{28A0092B-C50C-407E-A947-70E740481C1C}">
+                <a14:useLocalDpi xmlns:a14="http://schemas.microsoft.com/office/drawing/2010/main" val="0"/>
+              </a:ext>
+            </a:extLst>
+          </a:blip>
+          <a:stretch>
+            <a:fillRect/>
+          </a:stretch>
+        </p:blipFill>
+        <p:spPr>
+          <a:xfrm>
+            <a:off x="399738" y="749508"/>
+            <a:ext cx="5151056" cy="626480"/>
+          </a:xfrm>
+          <a:prstGeom prst="rect">
+            <a:avLst/>
+          </a:prstGeom>
+        </p:spPr>
+      </p:pic>
+      <p:pic>
+        <p:nvPicPr>
+          <p:cNvPr id="6" name="Picture 5"/>
+          <p:cNvPicPr>
+            <a:picLocks noChangeAspect="1"/>
+          </p:cNvPicPr>
+          <p:nvPr/>
+        </p:nvPicPr>
+        <p:blipFill>
+          <a:blip r:embed="rId3">
+            <a:extLst>
+              <a:ext uri="{28A0092B-C50C-407E-A947-70E740481C1C}">
+                <a14:useLocalDpi xmlns:a14="http://schemas.microsoft.com/office/drawing/2010/main" val="0"/>
+              </a:ext>
+            </a:extLst>
+          </a:blip>
+          <a:stretch>
+            <a:fillRect/>
+          </a:stretch>
+        </p:blipFill>
+        <p:spPr>
+          <a:xfrm>
+            <a:off x="399738" y="1336023"/>
+            <a:ext cx="3916251" cy="2094984"/>
+          </a:xfrm>
+          <a:prstGeom prst="rect">
+            <a:avLst/>
+          </a:prstGeom>
+        </p:spPr>
+      </p:pic>
+      <p:pic>
+        <p:nvPicPr>
+          <p:cNvPr id="9" name="Picture 8"/>
+          <p:cNvPicPr>
+            <a:picLocks noChangeAspect="1"/>
+          </p:cNvPicPr>
+          <p:nvPr/>
+        </p:nvPicPr>
+        <p:blipFill>
+          <a:blip r:embed="rId4">
+            <a:extLst>
+              <a:ext uri="{28A0092B-C50C-407E-A947-70E740481C1C}">
+                <a14:useLocalDpi xmlns:a14="http://schemas.microsoft.com/office/drawing/2010/main" val="0"/>
+              </a:ext>
+            </a:extLst>
+          </a:blip>
+          <a:stretch>
+            <a:fillRect/>
+          </a:stretch>
+        </p:blipFill>
+        <p:spPr>
+          <a:xfrm>
+            <a:off x="4260812" y="3426149"/>
+            <a:ext cx="1832504" cy="2190482"/>
+          </a:xfrm>
+          <a:prstGeom prst="rect">
+            <a:avLst/>
+          </a:prstGeom>
+        </p:spPr>
+      </p:pic>
+      <p:pic>
+        <p:nvPicPr>
+          <p:cNvPr id="10" name="Picture 9"/>
+          <p:cNvPicPr>
+            <a:picLocks noChangeAspect="1"/>
+          </p:cNvPicPr>
+          <p:nvPr/>
+        </p:nvPicPr>
+        <p:blipFill>
+          <a:blip r:embed="rId5">
+            <a:extLst>
+              <a:ext uri="{28A0092B-C50C-407E-A947-70E740481C1C}">
+                <a14:useLocalDpi xmlns:a14="http://schemas.microsoft.com/office/drawing/2010/main" val="0"/>
+              </a:ext>
+            </a:extLst>
+          </a:blip>
+          <a:stretch>
+            <a:fillRect/>
+          </a:stretch>
+        </p:blipFill>
+        <p:spPr>
+          <a:xfrm>
+            <a:off x="6060517" y="3426149"/>
+            <a:ext cx="2014909" cy="2190482"/>
+          </a:xfrm>
+          <a:prstGeom prst="rect">
+            <a:avLst/>
+          </a:prstGeom>
+        </p:spPr>
+      </p:pic>
+      <p:pic>
+        <p:nvPicPr>
+          <p:cNvPr id="11" name="Picture 10"/>
+          <p:cNvPicPr>
+            <a:picLocks noChangeAspect="1"/>
+          </p:cNvPicPr>
+          <p:nvPr/>
+        </p:nvPicPr>
+        <p:blipFill>
+          <a:blip r:embed="rId6">
+            <a:extLst>
+              <a:ext uri="{28A0092B-C50C-407E-A947-70E740481C1C}">
+                <a14:useLocalDpi xmlns:a14="http://schemas.microsoft.com/office/drawing/2010/main" val="0"/>
+              </a:ext>
+            </a:extLst>
+          </a:blip>
+          <a:stretch>
+            <a:fillRect/>
+          </a:stretch>
+        </p:blipFill>
+        <p:spPr>
+          <a:xfrm>
+            <a:off x="7958619" y="3426149"/>
+            <a:ext cx="788168" cy="2078686"/>
+          </a:xfrm>
+          <a:prstGeom prst="rect">
+            <a:avLst/>
+          </a:prstGeom>
+        </p:spPr>
+      </p:pic>
+      <p:pic>
+        <p:nvPicPr>
+          <p:cNvPr id="12" name="Picture 11"/>
+          <p:cNvPicPr>
+            <a:picLocks noChangeAspect="1"/>
+          </p:cNvPicPr>
+          <p:nvPr/>
+        </p:nvPicPr>
+        <p:blipFill>
+          <a:blip r:embed="rId7">
+            <a:extLst>
+              <a:ext uri="{28A0092B-C50C-407E-A947-70E740481C1C}">
+                <a14:useLocalDpi xmlns:a14="http://schemas.microsoft.com/office/drawing/2010/main" val="0"/>
+              </a:ext>
+            </a:extLst>
+          </a:blip>
+          <a:stretch>
+            <a:fillRect/>
+          </a:stretch>
+        </p:blipFill>
+        <p:spPr>
+          <a:xfrm>
+            <a:off x="8770041" y="3426149"/>
+            <a:ext cx="3337162" cy="2025834"/>
+          </a:xfrm>
+          <a:prstGeom prst="rect">
+            <a:avLst/>
+          </a:prstGeom>
+        </p:spPr>
+      </p:pic>
+      <p:pic>
+        <p:nvPicPr>
+          <p:cNvPr id="13" name="Picture 12"/>
+          <p:cNvPicPr>
+            <a:picLocks noChangeAspect="1"/>
+          </p:cNvPicPr>
+          <p:nvPr/>
+        </p:nvPicPr>
+        <p:blipFill>
+          <a:blip r:embed="rId8">
+            <a:extLst>
+              <a:ext uri="{28A0092B-C50C-407E-A947-70E740481C1C}">
+                <a14:useLocalDpi xmlns:a14="http://schemas.microsoft.com/office/drawing/2010/main" val="0"/>
+              </a:ext>
+            </a:extLst>
+          </a:blip>
+          <a:stretch>
+            <a:fillRect/>
+          </a:stretch>
+        </p:blipFill>
+        <p:spPr>
+          <a:xfrm>
+            <a:off x="4346785" y="2048500"/>
+            <a:ext cx="1663700" cy="698500"/>
+          </a:xfrm>
+          <a:prstGeom prst="rect">
+            <a:avLst/>
+          </a:prstGeom>
+        </p:spPr>
+      </p:pic>
+      <p:sp>
+        <p:nvSpPr>
+          <p:cNvPr id="19" name="TextBox 18"/>
+          <p:cNvSpPr txBox="1"/>
+          <p:nvPr/>
+        </p:nvSpPr>
+        <p:spPr>
+          <a:xfrm>
+            <a:off x="6095797" y="2925299"/>
+            <a:ext cx="1276662" cy="369332"/>
+          </a:xfrm>
+          <a:prstGeom prst="rect">
+            <a:avLst/>
+          </a:prstGeom>
+          <a:noFill/>
+        </p:spPr>
+        <p:txBody>
+          <a:bodyPr wrap="square" rtlCol="0">
+            <a:spAutoFit/>
+          </a:bodyPr>
+          <a:lstStyle/>
+          <a:p>
+            <a:r>
+              <a:rPr lang="en-US" b="1" dirty="0" err="1" smtClean="0"/>
+              <a:t>timeseqs</a:t>
+            </a:r>
+            <a:endParaRPr lang="en-US" b="1" dirty="0"/>
+          </a:p>
+        </p:txBody>
+      </p:sp>
+      <p:sp>
+        <p:nvSpPr>
+          <p:cNvPr id="20" name="TextBox 19"/>
+          <p:cNvSpPr txBox="1"/>
+          <p:nvPr/>
+        </p:nvSpPr>
+        <p:spPr>
+          <a:xfrm>
+            <a:off x="7846893" y="2901024"/>
+            <a:ext cx="1297351" cy="369332"/>
+          </a:xfrm>
+          <a:prstGeom prst="rect">
+            <a:avLst/>
+          </a:prstGeom>
+          <a:noFill/>
+        </p:spPr>
+        <p:txBody>
+          <a:bodyPr wrap="square" rtlCol="0">
+            <a:spAutoFit/>
+          </a:bodyPr>
+          <a:lstStyle/>
+          <a:p>
+            <a:r>
+              <a:rPr lang="en-US" b="1" dirty="0"/>
+              <a:t>t</a:t>
+            </a:r>
+            <a:r>
+              <a:rPr lang="en-US" b="1" dirty="0" smtClean="0"/>
+              <a:t>imeseqs2</a:t>
+            </a:r>
+            <a:endParaRPr lang="en-US" b="1" dirty="0"/>
+          </a:p>
+        </p:txBody>
+      </p:sp>
+      <p:sp>
+        <p:nvSpPr>
+          <p:cNvPr id="21" name="TextBox 20"/>
+          <p:cNvSpPr txBox="1"/>
+          <p:nvPr/>
+        </p:nvSpPr>
+        <p:spPr>
+          <a:xfrm>
+            <a:off x="4344700" y="2901024"/>
+            <a:ext cx="2553324" cy="369332"/>
+          </a:xfrm>
+          <a:prstGeom prst="rect">
+            <a:avLst/>
+          </a:prstGeom>
+          <a:noFill/>
+        </p:spPr>
+        <p:txBody>
+          <a:bodyPr wrap="square" rtlCol="0">
+            <a:spAutoFit/>
+          </a:bodyPr>
+          <a:lstStyle/>
+          <a:p>
+            <a:r>
+              <a:rPr lang="en-US" b="1" dirty="0" smtClean="0"/>
+              <a:t>lines</a:t>
+            </a:r>
+            <a:endParaRPr lang="en-US" b="1" dirty="0"/>
+          </a:p>
+        </p:txBody>
+      </p:sp>
+      <p:sp>
+        <p:nvSpPr>
+          <p:cNvPr id="22" name="TextBox 21"/>
+          <p:cNvSpPr txBox="1"/>
+          <p:nvPr/>
+        </p:nvSpPr>
+        <p:spPr>
+          <a:xfrm>
+            <a:off x="9494165" y="2887981"/>
+            <a:ext cx="2553324" cy="369332"/>
+          </a:xfrm>
+          <a:prstGeom prst="rect">
+            <a:avLst/>
+          </a:prstGeom>
+          <a:noFill/>
+        </p:spPr>
+        <p:txBody>
+          <a:bodyPr wrap="square" rtlCol="0">
+            <a:spAutoFit/>
+          </a:bodyPr>
+          <a:lstStyle/>
+          <a:p>
+            <a:r>
+              <a:rPr lang="en-US" b="1" dirty="0" smtClean="0"/>
+              <a:t>timeseqs3</a:t>
+            </a:r>
+            <a:endParaRPr lang="en-US" b="1" dirty="0"/>
+          </a:p>
+        </p:txBody>
+      </p:sp>
+      <p:sp>
+        <p:nvSpPr>
+          <p:cNvPr id="14" name="TextBox 13"/>
+          <p:cNvSpPr txBox="1"/>
+          <p:nvPr/>
+        </p:nvSpPr>
+        <p:spPr>
+          <a:xfrm>
+            <a:off x="399738" y="4017522"/>
+            <a:ext cx="3307532" cy="1477328"/>
+          </a:xfrm>
+          <a:prstGeom prst="rect">
+            <a:avLst/>
+          </a:prstGeom>
+          <a:noFill/>
+        </p:spPr>
+        <p:txBody>
+          <a:bodyPr wrap="square" rtlCol="0">
+            <a:spAutoFit/>
+          </a:bodyPr>
+          <a:lstStyle/>
+          <a:p>
+            <a:r>
+              <a:rPr lang="en-US" dirty="0" smtClean="0"/>
+              <a:t>Note: </a:t>
+            </a:r>
+          </a:p>
+          <a:p>
+            <a:pPr marL="285750" indent="-285750">
+              <a:buFontTx/>
+              <a:buChar char="-"/>
+            </a:pPr>
+            <a:r>
+              <a:rPr lang="en-US" dirty="0" smtClean="0"/>
+              <a:t>Shape of timeseqs2 is different </a:t>
+            </a:r>
+          </a:p>
+          <a:p>
+            <a:pPr marL="285750" indent="-285750">
+              <a:buFontTx/>
+              <a:buChar char="-"/>
+            </a:pPr>
+            <a:r>
+              <a:rPr lang="en-US" dirty="0" smtClean="0"/>
+              <a:t>Timeseq3 is the time of activity</a:t>
+            </a:r>
+            <a:endParaRPr lang="en-US" dirty="0"/>
+          </a:p>
+        </p:txBody>
+      </p:sp>
+      <p:sp>
+        <p:nvSpPr>
+          <p:cNvPr id="18" name="Right Arrow 17"/>
+          <p:cNvSpPr/>
+          <p:nvPr/>
+        </p:nvSpPr>
+        <p:spPr>
+          <a:xfrm>
+            <a:off x="4344700" y="1679168"/>
+            <a:ext cx="987154" cy="283335"/>
+          </a:xfrm>
+          <a:prstGeom prst="rightArrow">
+            <a:avLst/>
+          </a:prstGeom>
+        </p:spPr>
+        <p:style>
+          <a:lnRef idx="2">
+            <a:schemeClr val="accent1">
+              <a:shade val="50000"/>
+            </a:schemeClr>
+          </a:lnRef>
+          <a:fillRef idx="1">
+            <a:schemeClr val="accent1"/>
+          </a:fillRef>
+          <a:effectRef idx="0">
+            <a:schemeClr val="accent1"/>
+          </a:effectRef>
+          <a:fontRef idx="minor">
+            <a:schemeClr val="lt1"/>
+          </a:fontRef>
+        </p:style>
+        <p:txBody>
+          <a:bodyPr rtlCol="0" anchor="ctr"/>
+          <a:lstStyle/>
+          <a:p>
+            <a:pPr algn="ctr"/>
+            <a:endParaRPr lang="en-US"/>
+          </a:p>
+        </p:txBody>
+      </p:sp>
+      <p:sp>
+        <p:nvSpPr>
+          <p:cNvPr id="23" name="TextBox 22"/>
+          <p:cNvSpPr txBox="1"/>
+          <p:nvPr/>
+        </p:nvSpPr>
+        <p:spPr>
+          <a:xfrm>
+            <a:off x="5331854" y="1614133"/>
+            <a:ext cx="3519012" cy="369332"/>
+          </a:xfrm>
+          <a:prstGeom prst="rect">
+            <a:avLst/>
+          </a:prstGeom>
+          <a:noFill/>
+        </p:spPr>
+        <p:txBody>
+          <a:bodyPr wrap="square" rtlCol="0">
+            <a:spAutoFit/>
+          </a:bodyPr>
+          <a:lstStyle/>
+          <a:p>
+            <a:r>
+              <a:rPr lang="en-US" dirty="0" smtClean="0"/>
+              <a:t>Fold 3 </a:t>
+            </a:r>
+            <a:r>
+              <a:rPr lang="en-US" smtClean="0"/>
+              <a:t>for testing</a:t>
+            </a:r>
+            <a:endParaRPr lang="en-US"/>
+          </a:p>
+        </p:txBody>
+      </p:sp>
+      <p:pic>
+        <p:nvPicPr>
+          <p:cNvPr id="4" name="Picture 3"/>
+          <p:cNvPicPr>
+            <a:picLocks noChangeAspect="1"/>
+          </p:cNvPicPr>
+          <p:nvPr/>
+        </p:nvPicPr>
+        <p:blipFill>
+          <a:blip r:embed="rId9">
+            <a:extLst>
+              <a:ext uri="{28A0092B-C50C-407E-A947-70E740481C1C}">
+                <a14:useLocalDpi xmlns:a14="http://schemas.microsoft.com/office/drawing/2010/main" val="0"/>
+              </a:ext>
+            </a:extLst>
+          </a:blip>
+          <a:stretch>
+            <a:fillRect/>
+          </a:stretch>
+        </p:blipFill>
+        <p:spPr>
+          <a:xfrm>
+            <a:off x="7091360" y="1364238"/>
+            <a:ext cx="4925270" cy="943538"/>
+          </a:xfrm>
+          <a:prstGeom prst="rect">
+            <a:avLst/>
+          </a:prstGeom>
+        </p:spPr>
+      </p:pic>
+      <p:sp>
+        <p:nvSpPr>
+          <p:cNvPr id="5" name="Right Arrow 4"/>
+          <p:cNvSpPr/>
+          <p:nvPr/>
+        </p:nvSpPr>
+        <p:spPr>
+          <a:xfrm rot="5400000">
+            <a:off x="4547330" y="5721449"/>
+            <a:ext cx="217440" cy="124941"/>
+          </a:xfrm>
+          <a:prstGeom prst="rightArrow">
+            <a:avLst/>
+          </a:prstGeom>
+        </p:spPr>
+        <p:style>
+          <a:lnRef idx="2">
+            <a:schemeClr val="accent1">
+              <a:shade val="50000"/>
+            </a:schemeClr>
+          </a:lnRef>
+          <a:fillRef idx="1">
+            <a:schemeClr val="accent1"/>
+          </a:fillRef>
+          <a:effectRef idx="0">
+            <a:schemeClr val="accent1"/>
+          </a:effectRef>
+          <a:fontRef idx="minor">
+            <a:schemeClr val="lt1"/>
+          </a:fontRef>
+        </p:style>
+        <p:txBody>
+          <a:bodyPr rtlCol="0" anchor="ctr"/>
+          <a:lstStyle/>
+          <a:p>
+            <a:pPr algn="ctr"/>
+            <a:endParaRPr lang="en-US"/>
+          </a:p>
+        </p:txBody>
+      </p:sp>
+      <p:sp>
+        <p:nvSpPr>
+          <p:cNvPr id="24" name="TextBox 23"/>
+          <p:cNvSpPr txBox="1"/>
+          <p:nvPr/>
+        </p:nvSpPr>
+        <p:spPr>
+          <a:xfrm>
+            <a:off x="6578058" y="5618983"/>
+            <a:ext cx="1276662" cy="369332"/>
+          </a:xfrm>
+          <a:prstGeom prst="rect">
+            <a:avLst/>
+          </a:prstGeom>
+          <a:noFill/>
+        </p:spPr>
+        <p:txBody>
+          <a:bodyPr wrap="square" rtlCol="0">
+            <a:spAutoFit/>
+          </a:bodyPr>
+          <a:lstStyle/>
+          <a:p>
+            <a:r>
+              <a:rPr lang="en-US" b="1" dirty="0" err="1"/>
+              <a:t>l</a:t>
+            </a:r>
+            <a:r>
+              <a:rPr lang="en-US" b="1" dirty="0" err="1" smtClean="0"/>
+              <a:t>ines_t</a:t>
+            </a:r>
+            <a:endParaRPr lang="en-US" b="1" dirty="0"/>
+          </a:p>
+        </p:txBody>
+      </p:sp>
+      <p:sp>
+        <p:nvSpPr>
+          <p:cNvPr id="25" name="TextBox 24"/>
+          <p:cNvSpPr txBox="1"/>
+          <p:nvPr/>
+        </p:nvSpPr>
+        <p:spPr>
+          <a:xfrm>
+            <a:off x="8273436" y="5567698"/>
+            <a:ext cx="1148146" cy="369332"/>
+          </a:xfrm>
+          <a:prstGeom prst="rect">
+            <a:avLst/>
+          </a:prstGeom>
+          <a:noFill/>
+        </p:spPr>
+        <p:txBody>
+          <a:bodyPr wrap="square" rtlCol="0">
+            <a:spAutoFit/>
+          </a:bodyPr>
+          <a:lstStyle/>
+          <a:p>
+            <a:r>
+              <a:rPr lang="en-US" b="1" dirty="0" smtClean="0"/>
+              <a:t>lines_t</a:t>
+            </a:r>
+            <a:r>
+              <a:rPr lang="en-US" b="1" dirty="0"/>
+              <a:t>2</a:t>
+            </a:r>
+          </a:p>
+        </p:txBody>
+      </p:sp>
+      <p:sp>
+        <p:nvSpPr>
+          <p:cNvPr id="26" name="TextBox 25"/>
+          <p:cNvSpPr txBox="1"/>
+          <p:nvPr/>
+        </p:nvSpPr>
+        <p:spPr>
+          <a:xfrm>
+            <a:off x="4768275" y="5636551"/>
+            <a:ext cx="987154" cy="369332"/>
+          </a:xfrm>
+          <a:prstGeom prst="rect">
+            <a:avLst/>
+          </a:prstGeom>
+          <a:noFill/>
+        </p:spPr>
+        <p:txBody>
+          <a:bodyPr wrap="square" rtlCol="0">
+            <a:spAutoFit/>
+          </a:bodyPr>
+          <a:lstStyle/>
+          <a:p>
+            <a:r>
+              <a:rPr lang="en-US" b="1" dirty="0" smtClean="0"/>
+              <a:t>lines</a:t>
+            </a:r>
+            <a:endParaRPr lang="en-US" b="1" dirty="0"/>
+          </a:p>
+        </p:txBody>
+      </p:sp>
+      <p:sp>
+        <p:nvSpPr>
+          <p:cNvPr id="27" name="TextBox 26"/>
+          <p:cNvSpPr txBox="1"/>
+          <p:nvPr/>
+        </p:nvSpPr>
+        <p:spPr>
+          <a:xfrm>
+            <a:off x="10034839" y="5567698"/>
+            <a:ext cx="1298569" cy="369332"/>
+          </a:xfrm>
+          <a:prstGeom prst="rect">
+            <a:avLst/>
+          </a:prstGeom>
+          <a:noFill/>
+        </p:spPr>
+        <p:txBody>
+          <a:bodyPr wrap="square" rtlCol="0">
+            <a:spAutoFit/>
+          </a:bodyPr>
+          <a:lstStyle/>
+          <a:p>
+            <a:r>
+              <a:rPr lang="en-US" b="1" dirty="0" smtClean="0"/>
+              <a:t>lines_t</a:t>
+            </a:r>
+            <a:r>
+              <a:rPr lang="en-US" b="1" dirty="0"/>
+              <a:t>3</a:t>
+            </a:r>
+          </a:p>
+        </p:txBody>
+      </p:sp>
+      <p:sp>
+        <p:nvSpPr>
+          <p:cNvPr id="28" name="Right Arrow 27"/>
+          <p:cNvSpPr/>
+          <p:nvPr/>
+        </p:nvSpPr>
+        <p:spPr>
+          <a:xfrm rot="5400000">
+            <a:off x="6335347" y="5718280"/>
+            <a:ext cx="217440" cy="124941"/>
+          </a:xfrm>
+          <a:prstGeom prst="rightArrow">
+            <a:avLst/>
+          </a:prstGeom>
+        </p:spPr>
+        <p:style>
+          <a:lnRef idx="2">
+            <a:schemeClr val="accent1">
+              <a:shade val="50000"/>
+            </a:schemeClr>
+          </a:lnRef>
+          <a:fillRef idx="1">
+            <a:schemeClr val="accent1"/>
+          </a:fillRef>
+          <a:effectRef idx="0">
+            <a:schemeClr val="accent1"/>
+          </a:effectRef>
+          <a:fontRef idx="minor">
+            <a:schemeClr val="lt1"/>
+          </a:fontRef>
+        </p:style>
+        <p:txBody>
+          <a:bodyPr rtlCol="0" anchor="ctr"/>
+          <a:lstStyle/>
+          <a:p>
+            <a:pPr algn="ctr"/>
+            <a:endParaRPr lang="en-US"/>
+          </a:p>
+        </p:txBody>
+      </p:sp>
+      <p:sp>
+        <p:nvSpPr>
+          <p:cNvPr id="29" name="Right Arrow 28"/>
+          <p:cNvSpPr/>
+          <p:nvPr/>
+        </p:nvSpPr>
+        <p:spPr>
+          <a:xfrm rot="5400000">
+            <a:off x="8131013" y="5714454"/>
+            <a:ext cx="217440" cy="124941"/>
+          </a:xfrm>
+          <a:prstGeom prst="rightArrow">
+            <a:avLst/>
+          </a:prstGeom>
+        </p:spPr>
+        <p:style>
+          <a:lnRef idx="2">
+            <a:schemeClr val="accent1">
+              <a:shade val="50000"/>
+            </a:schemeClr>
+          </a:lnRef>
+          <a:fillRef idx="1">
+            <a:schemeClr val="accent1"/>
+          </a:fillRef>
+          <a:effectRef idx="0">
+            <a:schemeClr val="accent1"/>
+          </a:effectRef>
+          <a:fontRef idx="minor">
+            <a:schemeClr val="lt1"/>
+          </a:fontRef>
+        </p:style>
+        <p:txBody>
+          <a:bodyPr rtlCol="0" anchor="ctr"/>
+          <a:lstStyle/>
+          <a:p>
+            <a:pPr algn="ctr"/>
+            <a:endParaRPr lang="en-US"/>
+          </a:p>
+        </p:txBody>
+      </p:sp>
+      <p:sp>
+        <p:nvSpPr>
+          <p:cNvPr id="30" name="Right Arrow 29"/>
+          <p:cNvSpPr/>
+          <p:nvPr/>
+        </p:nvSpPr>
+        <p:spPr>
+          <a:xfrm rot="5400000">
+            <a:off x="9822816" y="5714454"/>
+            <a:ext cx="217440" cy="124941"/>
+          </a:xfrm>
+          <a:prstGeom prst="rightArrow">
+            <a:avLst/>
+          </a:prstGeom>
+        </p:spPr>
+        <p:style>
+          <a:lnRef idx="2">
+            <a:schemeClr val="accent1">
+              <a:shade val="50000"/>
+            </a:schemeClr>
+          </a:lnRef>
+          <a:fillRef idx="1">
+            <a:schemeClr val="accent1"/>
+          </a:fillRef>
+          <a:effectRef idx="0">
+            <a:schemeClr val="accent1"/>
+          </a:effectRef>
+          <a:fontRef idx="minor">
+            <a:schemeClr val="lt1"/>
+          </a:fontRef>
+        </p:style>
+        <p:txBody>
+          <a:bodyPr rtlCol="0" anchor="ctr"/>
+          <a:lstStyle/>
+          <a:p>
+            <a:pPr algn="ctr"/>
+            <a:endParaRPr lang="en-US"/>
+          </a:p>
+        </p:txBody>
+      </p:sp>
+      <p:pic>
+        <p:nvPicPr>
+          <p:cNvPr id="7" name="Picture 6"/>
+          <p:cNvPicPr>
+            <a:picLocks noChangeAspect="1"/>
+          </p:cNvPicPr>
+          <p:nvPr/>
+        </p:nvPicPr>
+        <p:blipFill>
+          <a:blip r:embed="rId10">
+            <a:extLst>
+              <a:ext uri="{28A0092B-C50C-407E-A947-70E740481C1C}">
+                <a14:useLocalDpi xmlns:a14="http://schemas.microsoft.com/office/drawing/2010/main" val="0"/>
+              </a:ext>
+            </a:extLst>
+          </a:blip>
+          <a:stretch>
+            <a:fillRect/>
+          </a:stretch>
+        </p:blipFill>
+        <p:spPr>
+          <a:xfrm>
+            <a:off x="83888" y="6203146"/>
+            <a:ext cx="5027756" cy="545384"/>
+          </a:xfrm>
+          <a:prstGeom prst="rect">
+            <a:avLst/>
+          </a:prstGeom>
+        </p:spPr>
+      </p:pic>
+      <p:pic>
+        <p:nvPicPr>
+          <p:cNvPr id="8" name="Picture 7"/>
+          <p:cNvPicPr>
+            <a:picLocks noChangeAspect="1"/>
+          </p:cNvPicPr>
+          <p:nvPr/>
+        </p:nvPicPr>
+        <p:blipFill>
+          <a:blip r:embed="rId11">
+            <a:extLst>
+              <a:ext uri="{28A0092B-C50C-407E-A947-70E740481C1C}">
+                <a14:useLocalDpi xmlns:a14="http://schemas.microsoft.com/office/drawing/2010/main" val="0"/>
+              </a:ext>
+            </a:extLst>
+          </a:blip>
+          <a:stretch>
+            <a:fillRect/>
+          </a:stretch>
+        </p:blipFill>
+        <p:spPr>
+          <a:xfrm>
+            <a:off x="5713814" y="6203146"/>
+            <a:ext cx="5246108" cy="547718"/>
+          </a:xfrm>
+          <a:prstGeom prst="rect">
+            <a:avLst/>
+          </a:prstGeom>
+        </p:spPr>
+      </p:pic>
+    </p:spTree>
+    <p:extLst>
+      <p:ext uri="{BB962C8B-B14F-4D97-AF65-F5344CB8AC3E}">
+        <p14:creationId xmlns:p14="http://schemas.microsoft.com/office/powerpoint/2010/main" val="304100711"/>
+      </p:ext>
+    </p:extLst>
+  </p:cSld>
+  <p:clrMapOvr>
+    <a:masterClrMapping/>
+  </p:clrMapOvr>
+</p:sld>
+</file>
+
+<file path=ppt/slides/slide15.xml><?xml version="1.0" encoding="utf-8"?>
+<p:sld xmlns:a="http://schemas.openxmlformats.org/drawingml/2006/main" xmlns:r="http://schemas.openxmlformats.org/officeDocument/2006/relationships" xmlns:p="http://schemas.openxmlformats.org/presentationml/2006/main">
+  <p:cSld>
+    <p:spTree>
+      <p:nvGrpSpPr>
+        <p:cNvPr id="1" name=""/>
+        <p:cNvGrpSpPr/>
+        <p:nvPr/>
+      </p:nvGrpSpPr>
+      <p:grpSpPr>
+        <a:xfrm>
+          <a:off x="0" y="0"/>
+          <a:ext cx="0" cy="0"/>
+          <a:chOff x="0" y="0"/>
+          <a:chExt cx="0" cy="0"/>
+        </a:xfrm>
+      </p:grpSpPr>
+      <p:sp>
+        <p:nvSpPr>
+          <p:cNvPr id="2" name="Title 1"/>
+          <p:cNvSpPr>
+            <a:spLocks noGrp="1"/>
+          </p:cNvSpPr>
+          <p:nvPr>
+            <p:ph type="ctrTitle"/>
+          </p:nvPr>
+        </p:nvSpPr>
+        <p:spPr>
+          <a:xfrm>
+            <a:off x="399738" y="162993"/>
+            <a:ext cx="7312277" cy="586515"/>
+          </a:xfrm>
+        </p:spPr>
+        <p:txBody>
+          <a:bodyPr>
+            <a:normAutofit fontScale="90000"/>
+          </a:bodyPr>
+          <a:lstStyle/>
+          <a:p>
+            <a:pPr algn="l"/>
+            <a:r>
+              <a:rPr lang="en-US" sz="4000" b="1" dirty="0" err="1"/>
+              <a:t>evaluate_suffix_and_remaining_time</a:t>
+            </a:r>
+            <a:endParaRPr lang="en-US" sz="4000" b="1" dirty="0"/>
+          </a:p>
+        </p:txBody>
+      </p:sp>
+      <p:pic>
+        <p:nvPicPr>
+          <p:cNvPr id="7" name="Picture 6"/>
+          <p:cNvPicPr>
+            <a:picLocks noChangeAspect="1"/>
+          </p:cNvPicPr>
+          <p:nvPr/>
+        </p:nvPicPr>
+        <p:blipFill>
+          <a:blip r:embed="rId2">
+            <a:extLst>
+              <a:ext uri="{28A0092B-C50C-407E-A947-70E740481C1C}">
+                <a14:useLocalDpi xmlns:a14="http://schemas.microsoft.com/office/drawing/2010/main" val="0"/>
+              </a:ext>
+            </a:extLst>
+          </a:blip>
+          <a:stretch>
+            <a:fillRect/>
+          </a:stretch>
+        </p:blipFill>
+        <p:spPr>
+          <a:xfrm>
+            <a:off x="399738" y="749508"/>
+            <a:ext cx="7804749" cy="2213140"/>
+          </a:xfrm>
+          <a:prstGeom prst="rect">
+            <a:avLst/>
+          </a:prstGeom>
+        </p:spPr>
+      </p:pic>
+      <p:pic>
+        <p:nvPicPr>
+          <p:cNvPr id="8" name="Picture 7"/>
+          <p:cNvPicPr>
+            <a:picLocks noChangeAspect="1"/>
+          </p:cNvPicPr>
+          <p:nvPr/>
+        </p:nvPicPr>
+        <p:blipFill>
+          <a:blip r:embed="rId3">
+            <a:extLst>
+              <a:ext uri="{28A0092B-C50C-407E-A947-70E740481C1C}">
+                <a14:useLocalDpi xmlns:a14="http://schemas.microsoft.com/office/drawing/2010/main" val="0"/>
+              </a:ext>
+            </a:extLst>
+          </a:blip>
+          <a:stretch>
+            <a:fillRect/>
+          </a:stretch>
+        </p:blipFill>
+        <p:spPr>
+          <a:xfrm>
+            <a:off x="3315467" y="3119137"/>
+            <a:ext cx="1409700" cy="698500"/>
+          </a:xfrm>
+          <a:prstGeom prst="rect">
+            <a:avLst/>
+          </a:prstGeom>
+        </p:spPr>
+      </p:pic>
+      <p:pic>
+        <p:nvPicPr>
+          <p:cNvPr id="15" name="Picture 14"/>
+          <p:cNvPicPr>
+            <a:picLocks noChangeAspect="1"/>
+          </p:cNvPicPr>
+          <p:nvPr/>
+        </p:nvPicPr>
+        <p:blipFill>
+          <a:blip r:embed="rId4">
+            <a:extLst>
+              <a:ext uri="{28A0092B-C50C-407E-A947-70E740481C1C}">
+                <a14:useLocalDpi xmlns:a14="http://schemas.microsoft.com/office/drawing/2010/main" val="0"/>
+              </a:ext>
+            </a:extLst>
+          </a:blip>
+          <a:stretch>
+            <a:fillRect/>
+          </a:stretch>
+        </p:blipFill>
+        <p:spPr>
+          <a:xfrm>
+            <a:off x="0" y="4123057"/>
+            <a:ext cx="12192000" cy="1763305"/>
+          </a:xfrm>
+          <a:prstGeom prst="rect">
+            <a:avLst/>
+          </a:prstGeom>
+        </p:spPr>
+      </p:pic>
+      <p:pic>
+        <p:nvPicPr>
+          <p:cNvPr id="16" name="Picture 15"/>
+          <p:cNvPicPr>
+            <a:picLocks noChangeAspect="1"/>
+          </p:cNvPicPr>
+          <p:nvPr/>
+        </p:nvPicPr>
+        <p:blipFill>
+          <a:blip r:embed="rId5">
+            <a:extLst>
+              <a:ext uri="{28A0092B-C50C-407E-A947-70E740481C1C}">
+                <a14:useLocalDpi xmlns:a14="http://schemas.microsoft.com/office/drawing/2010/main" val="0"/>
+              </a:ext>
+            </a:extLst>
+          </a:blip>
+          <a:stretch>
+            <a:fillRect/>
+          </a:stretch>
+        </p:blipFill>
+        <p:spPr>
+          <a:xfrm>
+            <a:off x="399738" y="3074687"/>
+            <a:ext cx="2501900" cy="787400"/>
+          </a:xfrm>
+          <a:prstGeom prst="rect">
+            <a:avLst/>
+          </a:prstGeom>
+        </p:spPr>
+      </p:pic>
+      <p:cxnSp>
+        <p:nvCxnSpPr>
+          <p:cNvPr id="31" name="Straight Arrow Connector 30"/>
+          <p:cNvCxnSpPr/>
+          <p:nvPr/>
+        </p:nvCxnSpPr>
+        <p:spPr>
+          <a:xfrm>
+            <a:off x="4865298" y="3312543"/>
+            <a:ext cx="1794294" cy="0"/>
+          </a:xfrm>
+          <a:prstGeom prst="straightConnector1">
+            <a:avLst/>
+          </a:prstGeom>
+          <a:ln>
+            <a:tailEnd type="triangle"/>
+          </a:ln>
+        </p:spPr>
+        <p:style>
+          <a:lnRef idx="1">
+            <a:schemeClr val="accent1"/>
+          </a:lnRef>
+          <a:fillRef idx="0">
+            <a:schemeClr val="accent1"/>
+          </a:fillRef>
+          <a:effectRef idx="0">
+            <a:schemeClr val="accent1"/>
+          </a:effectRef>
+          <a:fontRef idx="minor">
+            <a:schemeClr val="tx1"/>
+          </a:fontRef>
+        </p:style>
+      </p:cxnSp>
+      <p:sp>
+        <p:nvSpPr>
+          <p:cNvPr id="32" name="TextBox 31"/>
+          <p:cNvSpPr txBox="1"/>
+          <p:nvPr/>
+        </p:nvSpPr>
+        <p:spPr>
+          <a:xfrm>
+            <a:off x="6659592" y="3051573"/>
+            <a:ext cx="2346385" cy="923330"/>
+          </a:xfrm>
+          <a:prstGeom prst="rect">
+            <a:avLst/>
+          </a:prstGeom>
+          <a:noFill/>
+        </p:spPr>
+        <p:txBody>
+          <a:bodyPr wrap="square" rtlCol="0">
+            <a:spAutoFit/>
+          </a:bodyPr>
+          <a:lstStyle/>
+          <a:p>
+            <a:r>
+              <a:rPr lang="en-US" b="1" dirty="0"/>
+              <a:t>g</a:t>
+            </a:r>
+            <a:r>
+              <a:rPr lang="vi-VN" b="1" dirty="0" smtClean="0"/>
+              <a:t>round_truth: next activity after suffix activities </a:t>
+            </a:r>
+            <a:endParaRPr lang="en-US" b="1" dirty="0"/>
+          </a:p>
+        </p:txBody>
+      </p:sp>
+      <p:sp>
+        <p:nvSpPr>
+          <p:cNvPr id="33" name="TextBox 32"/>
+          <p:cNvSpPr txBox="1"/>
+          <p:nvPr/>
+        </p:nvSpPr>
+        <p:spPr>
+          <a:xfrm>
+            <a:off x="931653" y="5886362"/>
+            <a:ext cx="9092241" cy="369332"/>
+          </a:xfrm>
+          <a:prstGeom prst="rect">
+            <a:avLst/>
+          </a:prstGeom>
+          <a:noFill/>
+        </p:spPr>
+        <p:txBody>
+          <a:bodyPr wrap="square" rtlCol="0">
+            <a:spAutoFit/>
+          </a:bodyPr>
+          <a:lstStyle/>
+          <a:p>
+            <a:r>
+              <a:rPr lang="vi-VN" b="1" dirty="0" smtClean="0"/>
+              <a:t>ground_truth_t: </a:t>
+            </a:r>
+            <a:r>
+              <a:rPr lang="en-US" b="1" dirty="0" smtClean="0"/>
+              <a:t>610689 = 611523 </a:t>
+            </a:r>
+            <a:r>
+              <a:rPr lang="mr-IN" b="1" dirty="0" smtClean="0"/>
+              <a:t>–</a:t>
+            </a:r>
+            <a:r>
+              <a:rPr lang="en-US" b="1" dirty="0" smtClean="0"/>
+              <a:t> 834: remaining time after suffix activities</a:t>
+            </a:r>
+            <a:endParaRPr lang="en-US" b="1" dirty="0"/>
+          </a:p>
+        </p:txBody>
+      </p:sp>
+      <p:cxnSp>
+        <p:nvCxnSpPr>
+          <p:cNvPr id="35" name="Straight Arrow Connector 34"/>
+          <p:cNvCxnSpPr/>
+          <p:nvPr/>
+        </p:nvCxnSpPr>
+        <p:spPr>
+          <a:xfrm flipV="1">
+            <a:off x="2398143" y="1311215"/>
+            <a:ext cx="6400800" cy="17253"/>
+          </a:xfrm>
+          <a:prstGeom prst="straightConnector1">
+            <a:avLst/>
+          </a:prstGeom>
+          <a:ln>
+            <a:tailEnd type="triangle"/>
+          </a:ln>
+        </p:spPr>
+        <p:style>
+          <a:lnRef idx="1">
+            <a:schemeClr val="accent1"/>
+          </a:lnRef>
+          <a:fillRef idx="0">
+            <a:schemeClr val="accent1"/>
+          </a:fillRef>
+          <a:effectRef idx="0">
+            <a:schemeClr val="accent1"/>
+          </a:effectRef>
+          <a:fontRef idx="minor">
+            <a:schemeClr val="tx1"/>
+          </a:fontRef>
+        </p:style>
+      </p:cxnSp>
+      <p:sp>
+        <p:nvSpPr>
+          <p:cNvPr id="36" name="TextBox 35"/>
+          <p:cNvSpPr txBox="1"/>
+          <p:nvPr/>
+        </p:nvSpPr>
+        <p:spPr>
+          <a:xfrm>
+            <a:off x="8753654" y="988049"/>
+            <a:ext cx="2898476" cy="646331"/>
+          </a:xfrm>
+          <a:prstGeom prst="rect">
+            <a:avLst/>
+          </a:prstGeom>
+          <a:noFill/>
+        </p:spPr>
+        <p:txBody>
+          <a:bodyPr wrap="square" rtlCol="0">
+            <a:spAutoFit/>
+          </a:bodyPr>
+          <a:lstStyle/>
+          <a:p>
+            <a:r>
+              <a:rPr lang="en-US" dirty="0" smtClean="0"/>
+              <a:t>To deal with short case when suffix&gt;</a:t>
+            </a:r>
+            <a:r>
+              <a:rPr lang="en-US" dirty="0" err="1" smtClean="0"/>
+              <a:t>len</a:t>
+            </a:r>
+            <a:r>
+              <a:rPr lang="en-US" dirty="0" smtClean="0"/>
+              <a:t>(case)</a:t>
+            </a:r>
+            <a:endParaRPr lang="en-US" dirty="0"/>
+          </a:p>
+        </p:txBody>
+      </p:sp>
+      <p:pic>
+        <p:nvPicPr>
+          <p:cNvPr id="37" name="Picture 36"/>
+          <p:cNvPicPr>
+            <a:picLocks noChangeAspect="1"/>
+          </p:cNvPicPr>
+          <p:nvPr/>
+        </p:nvPicPr>
+        <p:blipFill>
+          <a:blip r:embed="rId6">
+            <a:extLst>
+              <a:ext uri="{28A0092B-C50C-407E-A947-70E740481C1C}">
+                <a14:useLocalDpi xmlns:a14="http://schemas.microsoft.com/office/drawing/2010/main" val="0"/>
+              </a:ext>
+            </a:extLst>
+          </a:blip>
+          <a:stretch>
+            <a:fillRect/>
+          </a:stretch>
+        </p:blipFill>
+        <p:spPr>
+          <a:xfrm>
+            <a:off x="8238169" y="1569721"/>
+            <a:ext cx="3953831" cy="595200"/>
+          </a:xfrm>
+          <a:prstGeom prst="rect">
+            <a:avLst/>
+          </a:prstGeom>
+        </p:spPr>
+      </p:pic>
+      <p:pic>
+        <p:nvPicPr>
+          <p:cNvPr id="38" name="Picture 37"/>
+          <p:cNvPicPr>
+            <a:picLocks noChangeAspect="1"/>
+          </p:cNvPicPr>
+          <p:nvPr/>
+        </p:nvPicPr>
+        <p:blipFill>
+          <a:blip r:embed="rId7">
+            <a:extLst>
+              <a:ext uri="{28A0092B-C50C-407E-A947-70E740481C1C}">
+                <a14:useLocalDpi xmlns:a14="http://schemas.microsoft.com/office/drawing/2010/main" val="0"/>
+              </a:ext>
+            </a:extLst>
+          </a:blip>
+          <a:stretch>
+            <a:fillRect/>
+          </a:stretch>
+        </p:blipFill>
+        <p:spPr>
+          <a:xfrm>
+            <a:off x="8204487" y="2198028"/>
+            <a:ext cx="2269022" cy="528238"/>
+          </a:xfrm>
+          <a:prstGeom prst="rect">
+            <a:avLst/>
+          </a:prstGeom>
+        </p:spPr>
+      </p:pic>
+    </p:spTree>
+    <p:extLst>
+      <p:ext uri="{BB962C8B-B14F-4D97-AF65-F5344CB8AC3E}">
+        <p14:creationId xmlns:p14="http://schemas.microsoft.com/office/powerpoint/2010/main" val="402446683"/>
+      </p:ext>
+    </p:extLst>
+  </p:cSld>
+  <p:clrMapOvr>
+    <a:masterClrMapping/>
+  </p:clrMapOvr>
+</p:sld>
+</file>
+
+<file path=ppt/slides/slide16.xml><?xml version="1.0" encoding="utf-8"?>
+<p:sld xmlns:a="http://schemas.openxmlformats.org/drawingml/2006/main" xmlns:r="http://schemas.openxmlformats.org/officeDocument/2006/relationships" xmlns:p="http://schemas.openxmlformats.org/presentationml/2006/main">
+  <p:cSld>
+    <p:spTree>
+      <p:nvGrpSpPr>
+        <p:cNvPr id="1" name=""/>
+        <p:cNvGrpSpPr/>
+        <p:nvPr/>
+      </p:nvGrpSpPr>
+      <p:grpSpPr>
+        <a:xfrm>
+          <a:off x="0" y="0"/>
+          <a:ext cx="0" cy="0"/>
+          <a:chOff x="0" y="0"/>
+          <a:chExt cx="0" cy="0"/>
+        </a:xfrm>
+      </p:grpSpPr>
+      <p:sp>
+        <p:nvSpPr>
+          <p:cNvPr id="2" name="Title 1"/>
+          <p:cNvSpPr>
+            <a:spLocks noGrp="1"/>
+          </p:cNvSpPr>
+          <p:nvPr>
+            <p:ph type="ctrTitle"/>
+          </p:nvPr>
+        </p:nvSpPr>
+        <p:spPr>
+          <a:xfrm>
+            <a:off x="399738" y="162993"/>
             <a:ext cx="7312277" cy="586515"/>
           </a:xfrm>
         </p:spPr>
@@ -6157,7 +6461,7 @@
 </p:sld>
 </file>
 
-<file path=ppt/slides/slide15.xml><?xml version="1.0" encoding="utf-8"?>
+<file path=ppt/slides/slide17.xml><?xml version="1.0" encoding="utf-8"?>
 <p:sld xmlns:a="http://schemas.openxmlformats.org/drawingml/2006/main" xmlns:r="http://schemas.openxmlformats.org/officeDocument/2006/relationships" xmlns:p="http://schemas.openxmlformats.org/presentationml/2006/main">
   <p:cSld>
     <p:spTree>
@@ -9824,11 +10128,7 @@
           <a:p>
             <a:r>
               <a:rPr lang="en-US" dirty="0" smtClean="0"/>
-              <a:t>Q: Why </a:t>
-            </a:r>
-            <a:r>
-              <a:rPr lang="en-US" dirty="0" smtClean="0"/>
-              <a:t>we have only 5 features but </a:t>
+              <a:t>Q: Why we have only 5 features but </a:t>
             </a:r>
             <a:r>
               <a:rPr lang="en-US" dirty="0" err="1" smtClean="0"/>
@@ -9836,11 +10136,7 @@
             </a:r>
             <a:r>
               <a:rPr lang="en-US" dirty="0" smtClean="0"/>
-              <a:t>[2] =10</a:t>
-            </a:r>
-            <a:r>
-              <a:rPr lang="en-US" dirty="0" smtClean="0"/>
-              <a:t>???</a:t>
+              <a:t>[2] =10???</a:t>
             </a:r>
           </a:p>
           <a:p>

</xml_diff>

<commit_message>
updated result for experiment 2
</commit_message>
<xml_diff>
--- a/report.pptx
+++ b/report.pptx
@@ -3884,7 +3884,7 @@
         </p:blipFill>
         <p:spPr>
           <a:xfrm>
-            <a:off x="4888523" y="227650"/>
+            <a:off x="2794000" y="162993"/>
             <a:ext cx="6451600" cy="457200"/>
           </a:xfrm>
           <a:prstGeom prst="rect">
@@ -4052,8 +4052,8 @@
         </p:nvSpPr>
         <p:spPr>
           <a:xfrm>
-            <a:off x="3727938" y="281354"/>
-            <a:ext cx="7350370" cy="369332"/>
+            <a:off x="3265121" y="290760"/>
+            <a:ext cx="2461358" cy="369332"/>
           </a:xfrm>
           <a:prstGeom prst="rect">
             <a:avLst/>
@@ -4074,6 +4074,186 @@
           </a:p>
         </p:txBody>
       </p:sp>
+      <p:pic>
+        <p:nvPicPr>
+          <p:cNvPr id="4" name="Picture 3"/>
+          <p:cNvPicPr>
+            <a:picLocks noChangeAspect="1"/>
+          </p:cNvPicPr>
+          <p:nvPr/>
+        </p:nvPicPr>
+        <p:blipFill>
+          <a:blip r:embed="rId2">
+            <a:extLst>
+              <a:ext uri="{28A0092B-C50C-407E-A947-70E740481C1C}">
+                <a14:useLocalDpi xmlns:a14="http://schemas.microsoft.com/office/drawing/2010/main" val="0"/>
+              </a:ext>
+            </a:extLst>
+          </a:blip>
+          <a:stretch>
+            <a:fillRect/>
+          </a:stretch>
+        </p:blipFill>
+        <p:spPr>
+          <a:xfrm>
+            <a:off x="317500" y="736600"/>
+            <a:ext cx="5415085" cy="2525848"/>
+          </a:xfrm>
+          <a:prstGeom prst="rect">
+            <a:avLst/>
+          </a:prstGeom>
+        </p:spPr>
+      </p:pic>
+      <p:pic>
+        <p:nvPicPr>
+          <p:cNvPr id="5" name="Picture 4"/>
+          <p:cNvPicPr>
+            <a:picLocks noChangeAspect="1"/>
+          </p:cNvPicPr>
+          <p:nvPr/>
+        </p:nvPicPr>
+        <p:blipFill>
+          <a:blip r:embed="rId3">
+            <a:extLst>
+              <a:ext uri="{28A0092B-C50C-407E-A947-70E740481C1C}">
+                <a14:useLocalDpi xmlns:a14="http://schemas.microsoft.com/office/drawing/2010/main" val="0"/>
+              </a:ext>
+            </a:extLst>
+          </a:blip>
+          <a:stretch>
+            <a:fillRect/>
+          </a:stretch>
+        </p:blipFill>
+        <p:spPr>
+          <a:xfrm>
+            <a:off x="5566507" y="177646"/>
+            <a:ext cx="6438900" cy="520700"/>
+          </a:xfrm>
+          <a:prstGeom prst="rect">
+            <a:avLst/>
+          </a:prstGeom>
+        </p:spPr>
+      </p:pic>
+      <p:pic>
+        <p:nvPicPr>
+          <p:cNvPr id="6" name="Picture 5"/>
+          <p:cNvPicPr>
+            <a:picLocks noChangeAspect="1"/>
+          </p:cNvPicPr>
+          <p:nvPr/>
+        </p:nvPicPr>
+        <p:blipFill>
+          <a:blip r:embed="rId4">
+            <a:extLst>
+              <a:ext uri="{28A0092B-C50C-407E-A947-70E740481C1C}">
+                <a14:useLocalDpi xmlns:a14="http://schemas.microsoft.com/office/drawing/2010/main" val="0"/>
+              </a:ext>
+            </a:extLst>
+          </a:blip>
+          <a:stretch>
+            <a:fillRect/>
+          </a:stretch>
+        </p:blipFill>
+        <p:spPr>
+          <a:xfrm>
+            <a:off x="5726479" y="768196"/>
+            <a:ext cx="3479800" cy="774700"/>
+          </a:xfrm>
+          <a:prstGeom prst="rect">
+            <a:avLst/>
+          </a:prstGeom>
+        </p:spPr>
+      </p:pic>
+      <p:pic>
+        <p:nvPicPr>
+          <p:cNvPr id="7" name="Picture 6"/>
+          <p:cNvPicPr>
+            <a:picLocks noChangeAspect="1"/>
+          </p:cNvPicPr>
+          <p:nvPr/>
+        </p:nvPicPr>
+        <p:blipFill>
+          <a:blip r:embed="rId5">
+            <a:extLst>
+              <a:ext uri="{28A0092B-C50C-407E-A947-70E740481C1C}">
+                <a14:useLocalDpi xmlns:a14="http://schemas.microsoft.com/office/drawing/2010/main" val="0"/>
+              </a:ext>
+            </a:extLst>
+          </a:blip>
+          <a:stretch>
+            <a:fillRect/>
+          </a:stretch>
+        </p:blipFill>
+        <p:spPr>
+          <a:xfrm>
+            <a:off x="5726479" y="1560718"/>
+            <a:ext cx="5397500" cy="749300"/>
+          </a:xfrm>
+          <a:prstGeom prst="rect">
+            <a:avLst/>
+          </a:prstGeom>
+        </p:spPr>
+      </p:pic>
+      <p:pic>
+        <p:nvPicPr>
+          <p:cNvPr id="8" name="Picture 7"/>
+          <p:cNvPicPr>
+            <a:picLocks noChangeAspect="1"/>
+          </p:cNvPicPr>
+          <p:nvPr/>
+        </p:nvPicPr>
+        <p:blipFill>
+          <a:blip r:embed="rId6">
+            <a:extLst>
+              <a:ext uri="{28A0092B-C50C-407E-A947-70E740481C1C}">
+                <a14:useLocalDpi xmlns:a14="http://schemas.microsoft.com/office/drawing/2010/main" val="0"/>
+              </a:ext>
+            </a:extLst>
+          </a:blip>
+          <a:stretch>
+            <a:fillRect/>
+          </a:stretch>
+        </p:blipFill>
+        <p:spPr>
+          <a:xfrm>
+            <a:off x="5726479" y="2405268"/>
+            <a:ext cx="6202972" cy="809083"/>
+          </a:xfrm>
+          <a:prstGeom prst="rect">
+            <a:avLst/>
+          </a:prstGeom>
+        </p:spPr>
+      </p:pic>
+      <p:pic>
+        <p:nvPicPr>
+          <p:cNvPr id="9" name="Picture 8"/>
+          <p:cNvPicPr>
+            <a:picLocks noChangeAspect="1"/>
+          </p:cNvPicPr>
+          <p:nvPr/>
+        </p:nvPicPr>
+        <p:blipFill>
+          <a:blip r:embed="rId7">
+            <a:extLst>
+              <a:ext uri="{28A0092B-C50C-407E-A947-70E740481C1C}">
+                <a14:useLocalDpi xmlns:a14="http://schemas.microsoft.com/office/drawing/2010/main" val="0"/>
+              </a:ext>
+            </a:extLst>
+          </a:blip>
+          <a:stretch>
+            <a:fillRect/>
+          </a:stretch>
+        </p:blipFill>
+        <p:spPr>
+          <a:xfrm>
+            <a:off x="317500" y="3516861"/>
+            <a:ext cx="7478346" cy="743609"/>
+          </a:xfrm>
+          <a:prstGeom prst="rect">
+            <a:avLst/>
+          </a:prstGeom>
+        </p:spPr>
+      </p:pic>
     </p:spTree>
     <p:extLst>
       <p:ext uri="{BB962C8B-B14F-4D97-AF65-F5344CB8AC3E}">
@@ -4159,11 +4339,7 @@
           <a:p>
             <a:r>
               <a:rPr lang="en-US" dirty="0" smtClean="0"/>
-              <a:t>Use </a:t>
-            </a:r>
-            <a:r>
-              <a:rPr lang="en-US" dirty="0" smtClean="0"/>
-              <a:t>Attention for act: </a:t>
+              <a:t>Use Attention for act: </a:t>
             </a:r>
             <a:r>
               <a:rPr lang="en-US" dirty="0" smtClean="0">

</xml_diff>

<commit_message>
added result of experiment 2
</commit_message>
<xml_diff>
--- a/report.pptx
+++ b/report.pptx
@@ -3983,6 +3983,186 @@
           </a:p>
         </p:txBody>
       </p:sp>
+      <p:pic>
+        <p:nvPicPr>
+          <p:cNvPr id="3" name="Picture 2"/>
+          <p:cNvPicPr>
+            <a:picLocks noChangeAspect="1"/>
+          </p:cNvPicPr>
+          <p:nvPr/>
+        </p:nvPicPr>
+        <p:blipFill>
+          <a:blip r:embed="rId2">
+            <a:extLst>
+              <a:ext uri="{28A0092B-C50C-407E-A947-70E740481C1C}">
+                <a14:useLocalDpi xmlns:a14="http://schemas.microsoft.com/office/drawing/2010/main" val="0"/>
+              </a:ext>
+            </a:extLst>
+          </a:blip>
+          <a:stretch>
+            <a:fillRect/>
+          </a:stretch>
+        </p:blipFill>
+        <p:spPr>
+          <a:xfrm>
+            <a:off x="272439" y="749508"/>
+            <a:ext cx="6324845" cy="3229708"/>
+          </a:xfrm>
+          <a:prstGeom prst="rect">
+            <a:avLst/>
+          </a:prstGeom>
+        </p:spPr>
+      </p:pic>
+      <p:pic>
+        <p:nvPicPr>
+          <p:cNvPr id="5" name="Picture 4"/>
+          <p:cNvPicPr>
+            <a:picLocks noChangeAspect="1"/>
+          </p:cNvPicPr>
+          <p:nvPr/>
+        </p:nvPicPr>
+        <p:blipFill>
+          <a:blip r:embed="rId3">
+            <a:extLst>
+              <a:ext uri="{28A0092B-C50C-407E-A947-70E740481C1C}">
+                <a14:useLocalDpi xmlns:a14="http://schemas.microsoft.com/office/drawing/2010/main" val="0"/>
+              </a:ext>
+            </a:extLst>
+          </a:blip>
+          <a:stretch>
+            <a:fillRect/>
+          </a:stretch>
+        </p:blipFill>
+        <p:spPr>
+          <a:xfrm>
+            <a:off x="6109676" y="998742"/>
+            <a:ext cx="2594708" cy="534720"/>
+          </a:xfrm>
+          <a:prstGeom prst="rect">
+            <a:avLst/>
+          </a:prstGeom>
+        </p:spPr>
+      </p:pic>
+      <p:pic>
+        <p:nvPicPr>
+          <p:cNvPr id="6" name="Picture 5"/>
+          <p:cNvPicPr>
+            <a:picLocks noChangeAspect="1"/>
+          </p:cNvPicPr>
+          <p:nvPr/>
+        </p:nvPicPr>
+        <p:blipFill>
+          <a:blip r:embed="rId4">
+            <a:extLst>
+              <a:ext uri="{28A0092B-C50C-407E-A947-70E740481C1C}">
+                <a14:useLocalDpi xmlns:a14="http://schemas.microsoft.com/office/drawing/2010/main" val="0"/>
+              </a:ext>
+            </a:extLst>
+          </a:blip>
+          <a:stretch>
+            <a:fillRect/>
+          </a:stretch>
+        </p:blipFill>
+        <p:spPr>
+          <a:xfrm>
+            <a:off x="6105769" y="1623962"/>
+            <a:ext cx="3739662" cy="509561"/>
+          </a:xfrm>
+          <a:prstGeom prst="rect">
+            <a:avLst/>
+          </a:prstGeom>
+        </p:spPr>
+      </p:pic>
+      <p:pic>
+        <p:nvPicPr>
+          <p:cNvPr id="7" name="Picture 6"/>
+          <p:cNvPicPr>
+            <a:picLocks noChangeAspect="1"/>
+          </p:cNvPicPr>
+          <p:nvPr/>
+        </p:nvPicPr>
+        <p:blipFill>
+          <a:blip r:embed="rId5">
+            <a:extLst>
+              <a:ext uri="{28A0092B-C50C-407E-A947-70E740481C1C}">
+                <a14:useLocalDpi xmlns:a14="http://schemas.microsoft.com/office/drawing/2010/main" val="0"/>
+              </a:ext>
+            </a:extLst>
+          </a:blip>
+          <a:stretch>
+            <a:fillRect/>
+          </a:stretch>
+        </p:blipFill>
+        <p:spPr>
+          <a:xfrm>
+            <a:off x="6096000" y="2165350"/>
+            <a:ext cx="5216769" cy="653372"/>
+          </a:xfrm>
+          <a:prstGeom prst="rect">
+            <a:avLst/>
+          </a:prstGeom>
+        </p:spPr>
+      </p:pic>
+      <p:pic>
+        <p:nvPicPr>
+          <p:cNvPr id="8" name="Picture 7"/>
+          <p:cNvPicPr>
+            <a:picLocks noChangeAspect="1"/>
+          </p:cNvPicPr>
+          <p:nvPr/>
+        </p:nvPicPr>
+        <p:blipFill>
+          <a:blip r:embed="rId6">
+            <a:extLst>
+              <a:ext uri="{28A0092B-C50C-407E-A947-70E740481C1C}">
+                <a14:useLocalDpi xmlns:a14="http://schemas.microsoft.com/office/drawing/2010/main" val="0"/>
+              </a:ext>
+            </a:extLst>
+          </a:blip>
+          <a:stretch>
+            <a:fillRect/>
+          </a:stretch>
+        </p:blipFill>
+        <p:spPr>
+          <a:xfrm>
+            <a:off x="272439" y="4064000"/>
+            <a:ext cx="10058400" cy="1008184"/>
+          </a:xfrm>
+          <a:prstGeom prst="rect">
+            <a:avLst/>
+          </a:prstGeom>
+        </p:spPr>
+      </p:pic>
+      <p:pic>
+        <p:nvPicPr>
+          <p:cNvPr id="9" name="Picture 8"/>
+          <p:cNvPicPr>
+            <a:picLocks noChangeAspect="1"/>
+          </p:cNvPicPr>
+          <p:nvPr/>
+        </p:nvPicPr>
+        <p:blipFill>
+          <a:blip r:embed="rId7">
+            <a:extLst>
+              <a:ext uri="{28A0092B-C50C-407E-A947-70E740481C1C}">
+                <a14:useLocalDpi xmlns:a14="http://schemas.microsoft.com/office/drawing/2010/main" val="0"/>
+              </a:ext>
+            </a:extLst>
+          </a:blip>
+          <a:stretch>
+            <a:fillRect/>
+          </a:stretch>
+        </p:blipFill>
+        <p:spPr>
+          <a:xfrm>
+            <a:off x="6096000" y="206213"/>
+            <a:ext cx="4975469" cy="445275"/>
+          </a:xfrm>
+          <a:prstGeom prst="rect">
+            <a:avLst/>
+          </a:prstGeom>
+        </p:spPr>
+      </p:pic>
     </p:spTree>
     <p:extLst>
       <p:ext uri="{BB962C8B-B14F-4D97-AF65-F5344CB8AC3E}">
@@ -4323,7 +4503,7 @@
         </p:nvSpPr>
         <p:spPr>
           <a:xfrm>
-            <a:off x="3727938" y="281354"/>
+            <a:off x="3045312" y="75971"/>
             <a:ext cx="3423139" cy="369332"/>
           </a:xfrm>
           <a:prstGeom prst="rect">
@@ -4383,8 +4563,158 @@
         </p:blipFill>
         <p:spPr>
           <a:xfrm>
-            <a:off x="399738" y="749508"/>
-            <a:ext cx="7988300" cy="4464383"/>
+            <a:off x="399738" y="749509"/>
+            <a:ext cx="5790910" cy="3236338"/>
+          </a:xfrm>
+          <a:prstGeom prst="rect">
+            <a:avLst/>
+          </a:prstGeom>
+        </p:spPr>
+      </p:pic>
+      <p:pic>
+        <p:nvPicPr>
+          <p:cNvPr id="5" name="Picture 4"/>
+          <p:cNvPicPr>
+            <a:picLocks noChangeAspect="1"/>
+          </p:cNvPicPr>
+          <p:nvPr/>
+        </p:nvPicPr>
+        <p:blipFill>
+          <a:blip r:embed="rId5">
+            <a:extLst>
+              <a:ext uri="{28A0092B-C50C-407E-A947-70E740481C1C}">
+                <a14:useLocalDpi xmlns:a14="http://schemas.microsoft.com/office/drawing/2010/main" val="0"/>
+              </a:ext>
+            </a:extLst>
+          </a:blip>
+          <a:stretch>
+            <a:fillRect/>
+          </a:stretch>
+        </p:blipFill>
+        <p:spPr>
+          <a:xfrm>
+            <a:off x="6253079" y="759377"/>
+            <a:ext cx="2742280" cy="544883"/>
+          </a:xfrm>
+          <a:prstGeom prst="rect">
+            <a:avLst/>
+          </a:prstGeom>
+        </p:spPr>
+      </p:pic>
+      <p:pic>
+        <p:nvPicPr>
+          <p:cNvPr id="6" name="Picture 5"/>
+          <p:cNvPicPr>
+            <a:picLocks noChangeAspect="1"/>
+          </p:cNvPicPr>
+          <p:nvPr/>
+        </p:nvPicPr>
+        <p:blipFill>
+          <a:blip r:embed="rId6">
+            <a:extLst>
+              <a:ext uri="{28A0092B-C50C-407E-A947-70E740481C1C}">
+                <a14:useLocalDpi xmlns:a14="http://schemas.microsoft.com/office/drawing/2010/main" val="0"/>
+              </a:ext>
+            </a:extLst>
+          </a:blip>
+          <a:stretch>
+            <a:fillRect/>
+          </a:stretch>
+        </p:blipFill>
+        <p:spPr>
+          <a:xfrm>
+            <a:off x="6253079" y="1327973"/>
+            <a:ext cx="4335357" cy="622300"/>
+          </a:xfrm>
+          <a:prstGeom prst="rect">
+            <a:avLst/>
+          </a:prstGeom>
+        </p:spPr>
+      </p:pic>
+      <p:pic>
+        <p:nvPicPr>
+          <p:cNvPr id="7" name="Picture 6"/>
+          <p:cNvPicPr>
+            <a:picLocks noChangeAspect="1"/>
+          </p:cNvPicPr>
+          <p:nvPr/>
+        </p:nvPicPr>
+        <p:blipFill>
+          <a:blip r:embed="rId7">
+            <a:extLst>
+              <a:ext uri="{28A0092B-C50C-407E-A947-70E740481C1C}">
+                <a14:useLocalDpi xmlns:a14="http://schemas.microsoft.com/office/drawing/2010/main" val="0"/>
+              </a:ext>
+            </a:extLst>
+          </a:blip>
+          <a:stretch>
+            <a:fillRect/>
+          </a:stretch>
+        </p:blipFill>
+        <p:spPr>
+          <a:xfrm>
+            <a:off x="6190648" y="2049096"/>
+            <a:ext cx="4460220" cy="578339"/>
+          </a:xfrm>
+          <a:prstGeom prst="rect">
+            <a:avLst/>
+          </a:prstGeom>
+        </p:spPr>
+      </p:pic>
+      <p:pic>
+        <p:nvPicPr>
+          <p:cNvPr id="8" name="Picture 7"/>
+          <p:cNvPicPr>
+            <a:picLocks noChangeAspect="1"/>
+          </p:cNvPicPr>
+          <p:nvPr/>
+        </p:nvPicPr>
+        <p:blipFill>
+          <a:blip r:embed="rId8">
+            <a:extLst>
+              <a:ext uri="{28A0092B-C50C-407E-A947-70E740481C1C}">
+                <a14:useLocalDpi xmlns:a14="http://schemas.microsoft.com/office/drawing/2010/main" val="0"/>
+              </a:ext>
+            </a:extLst>
+          </a:blip>
+          <a:stretch>
+            <a:fillRect/>
+          </a:stretch>
+        </p:blipFill>
+        <p:spPr>
+          <a:xfrm>
+            <a:off x="270551" y="3961113"/>
+            <a:ext cx="8099726" cy="769570"/>
+          </a:xfrm>
+          <a:prstGeom prst="rect">
+            <a:avLst/>
+          </a:prstGeom>
+        </p:spPr>
+      </p:pic>
+      <p:pic>
+        <p:nvPicPr>
+          <p:cNvPr id="9" name="Picture 8"/>
+          <p:cNvPicPr>
+            <a:picLocks noChangeAspect="1"/>
+          </p:cNvPicPr>
+          <p:nvPr/>
+        </p:nvPicPr>
+        <p:blipFill>
+          <a:blip r:embed="rId9">
+            <a:extLst>
+              <a:ext uri="{28A0092B-C50C-407E-A947-70E740481C1C}">
+                <a14:useLocalDpi xmlns:a14="http://schemas.microsoft.com/office/drawing/2010/main" val="0"/>
+              </a:ext>
+            </a:extLst>
+          </a:blip>
+          <a:stretch>
+            <a:fillRect/>
+          </a:stretch>
+        </p:blipFill>
+        <p:spPr>
+          <a:xfrm>
+            <a:off x="3662306" y="398734"/>
+            <a:ext cx="7743581" cy="397344"/>
           </a:xfrm>
           <a:prstGeom prst="rect">
             <a:avLst/>

</xml_diff>